<commit_message>
technician window done (including console log)
</commit_message>
<xml_diff>
--- a/Not_Shared/Ideas.pptx
+++ b/Not_Shared/Ideas.pptx
@@ -22,11 +22,13 @@
     <p:sldId id="275" r:id="rId16"/>
     <p:sldId id="267" r:id="rId17"/>
     <p:sldId id="276" r:id="rId18"/>
-    <p:sldId id="268" r:id="rId19"/>
-    <p:sldId id="269" r:id="rId20"/>
-    <p:sldId id="270" r:id="rId21"/>
-    <p:sldId id="271" r:id="rId22"/>
-    <p:sldId id="272" r:id="rId23"/>
+    <p:sldId id="279" r:id="rId19"/>
+    <p:sldId id="280" r:id="rId20"/>
+    <p:sldId id="268" r:id="rId21"/>
+    <p:sldId id="269" r:id="rId22"/>
+    <p:sldId id="270" r:id="rId23"/>
+    <p:sldId id="271" r:id="rId24"/>
+    <p:sldId id="272" r:id="rId25"/>
   </p:sldIdLst>
   <p:sldSz cx="12192000" cy="6858000"/>
   <p:notesSz cx="6858000" cy="9144000"/>
@@ -282,7 +284,7 @@
           <a:p>
             <a:fld id="{454D742E-0134-4A01-B575-6354CF2907B5}" type="datetimeFigureOut">
               <a:rPr lang="en-CA" smtClean="0"/>
-              <a:t>2020-05-02</a:t>
+              <a:t>2020-05-03</a:t>
             </a:fld>
             <a:endParaRPr lang="en-CA"/>
           </a:p>
@@ -482,7 +484,7 @@
           <a:p>
             <a:fld id="{454D742E-0134-4A01-B575-6354CF2907B5}" type="datetimeFigureOut">
               <a:rPr lang="en-CA" smtClean="0"/>
-              <a:t>2020-05-02</a:t>
+              <a:t>2020-05-03</a:t>
             </a:fld>
             <a:endParaRPr lang="en-CA"/>
           </a:p>
@@ -692,7 +694,7 @@
           <a:p>
             <a:fld id="{454D742E-0134-4A01-B575-6354CF2907B5}" type="datetimeFigureOut">
               <a:rPr lang="en-CA" smtClean="0"/>
-              <a:t>2020-05-02</a:t>
+              <a:t>2020-05-03</a:t>
             </a:fld>
             <a:endParaRPr lang="en-CA"/>
           </a:p>
@@ -892,7 +894,7 @@
           <a:p>
             <a:fld id="{454D742E-0134-4A01-B575-6354CF2907B5}" type="datetimeFigureOut">
               <a:rPr lang="en-CA" smtClean="0"/>
-              <a:t>2020-05-02</a:t>
+              <a:t>2020-05-03</a:t>
             </a:fld>
             <a:endParaRPr lang="en-CA"/>
           </a:p>
@@ -1168,7 +1170,7 @@
           <a:p>
             <a:fld id="{454D742E-0134-4A01-B575-6354CF2907B5}" type="datetimeFigureOut">
               <a:rPr lang="en-CA" smtClean="0"/>
-              <a:t>2020-05-02</a:t>
+              <a:t>2020-05-03</a:t>
             </a:fld>
             <a:endParaRPr lang="en-CA"/>
           </a:p>
@@ -1436,7 +1438,7 @@
           <a:p>
             <a:fld id="{454D742E-0134-4A01-B575-6354CF2907B5}" type="datetimeFigureOut">
               <a:rPr lang="en-CA" smtClean="0"/>
-              <a:t>2020-05-02</a:t>
+              <a:t>2020-05-03</a:t>
             </a:fld>
             <a:endParaRPr lang="en-CA"/>
           </a:p>
@@ -1851,7 +1853,7 @@
           <a:p>
             <a:fld id="{454D742E-0134-4A01-B575-6354CF2907B5}" type="datetimeFigureOut">
               <a:rPr lang="en-CA" smtClean="0"/>
-              <a:t>2020-05-02</a:t>
+              <a:t>2020-05-03</a:t>
             </a:fld>
             <a:endParaRPr lang="en-CA"/>
           </a:p>
@@ -1993,7 +1995,7 @@
           <a:p>
             <a:fld id="{454D742E-0134-4A01-B575-6354CF2907B5}" type="datetimeFigureOut">
               <a:rPr lang="en-CA" smtClean="0"/>
-              <a:t>2020-05-02</a:t>
+              <a:t>2020-05-03</a:t>
             </a:fld>
             <a:endParaRPr lang="en-CA"/>
           </a:p>
@@ -2106,7 +2108,7 @@
           <a:p>
             <a:fld id="{454D742E-0134-4A01-B575-6354CF2907B5}" type="datetimeFigureOut">
               <a:rPr lang="en-CA" smtClean="0"/>
-              <a:t>2020-05-02</a:t>
+              <a:t>2020-05-03</a:t>
             </a:fld>
             <a:endParaRPr lang="en-CA"/>
           </a:p>
@@ -2419,7 +2421,7 @@
           <a:p>
             <a:fld id="{454D742E-0134-4A01-B575-6354CF2907B5}" type="datetimeFigureOut">
               <a:rPr lang="en-CA" smtClean="0"/>
-              <a:t>2020-05-02</a:t>
+              <a:t>2020-05-03</a:t>
             </a:fld>
             <a:endParaRPr lang="en-CA"/>
           </a:p>
@@ -2708,7 +2710,7 @@
           <a:p>
             <a:fld id="{454D742E-0134-4A01-B575-6354CF2907B5}" type="datetimeFigureOut">
               <a:rPr lang="en-CA" smtClean="0"/>
-              <a:t>2020-05-02</a:t>
+              <a:t>2020-05-03</a:t>
             </a:fld>
             <a:endParaRPr lang="en-CA"/>
           </a:p>
@@ -2951,7 +2953,7 @@
           <a:p>
             <a:fld id="{454D742E-0134-4A01-B575-6354CF2907B5}" type="datetimeFigureOut">
               <a:rPr lang="en-CA" smtClean="0"/>
-              <a:t>2020-05-02</a:t>
+              <a:t>2020-05-03</a:t>
             </a:fld>
             <a:endParaRPr lang="en-CA"/>
           </a:p>
@@ -7628,45 +7630,12 @@
           <a:chExt cx="0" cy="0"/>
         </a:xfrm>
       </p:grpSpPr>
-      <p:sp>
-        <p:nvSpPr>
-          <p:cNvPr id="2" name="Title 1">
-            <a:extLst>
-              <a:ext uri="{FF2B5EF4-FFF2-40B4-BE49-F238E27FC236}">
-                <a16:creationId xmlns:a16="http://schemas.microsoft.com/office/drawing/2014/main" id="{8D67DFE2-A656-4EB7-87FE-78EFCF09B8D4}"/>
-              </a:ext>
-            </a:extLst>
-          </p:cNvPr>
-          <p:cNvSpPr>
-            <a:spLocks noGrp="1"/>
-          </p:cNvSpPr>
-          <p:nvPr>
-            <p:ph type="title"/>
-          </p:nvPr>
-        </p:nvSpPr>
-        <p:spPr>
-          <a:xfrm>
-            <a:off x="0" y="-68508"/>
-            <a:ext cx="10515600" cy="832079"/>
-          </a:xfrm>
-        </p:spPr>
-        <p:txBody>
-          <a:bodyPr/>
-          <a:lstStyle/>
-          <a:p>
-            <a:r>
-              <a:rPr lang="en-CA" dirty="0"/>
-              <a:t>Socket Connection</a:t>
-            </a:r>
-          </a:p>
-        </p:txBody>
-      </p:sp>
       <p:pic>
         <p:nvPicPr>
-          <p:cNvPr id="4" name="Picture 4" descr="Dedicated Server PNG Image | Server, Dedication, Png images">
-            <a:extLst>
-              <a:ext uri="{FF2B5EF4-FFF2-40B4-BE49-F238E27FC236}">
-                <a16:creationId xmlns:a16="http://schemas.microsoft.com/office/drawing/2014/main" id="{B8BBBA72-D009-4D28-BDFD-C4E6B0F3493C}"/>
+          <p:cNvPr id="1028" name="Picture 4" descr="Dedicated Server PNG Image | Server, Dedication, Png images">
+            <a:extLst>
+              <a:ext uri="{FF2B5EF4-FFF2-40B4-BE49-F238E27FC236}">
+                <a16:creationId xmlns:a16="http://schemas.microsoft.com/office/drawing/2014/main" id="{B259F46C-6CBA-4D56-93C3-3D41AC3A6B13}"/>
               </a:ext>
             </a:extLst>
           </p:cNvPr>
@@ -7690,8 +7659,8 @@
         </p:blipFill>
         <p:spPr bwMode="auto">
           <a:xfrm>
-            <a:off x="5359389" y="1019598"/>
-            <a:ext cx="770945" cy="1039475"/>
+            <a:off x="5268415" y="280021"/>
+            <a:ext cx="757916" cy="1021909"/>
           </a:xfrm>
           <a:prstGeom prst="rect">
             <a:avLst/>
@@ -7710,10 +7679,10 @@
       </p:pic>
       <p:pic>
         <p:nvPicPr>
-          <p:cNvPr id="5" name="Picture 6" descr="Laptop Clip Art At Clker Com Vector - Laptop Black And White Clip ...">
-            <a:extLst>
-              <a:ext uri="{FF2B5EF4-FFF2-40B4-BE49-F238E27FC236}">
-                <a16:creationId xmlns:a16="http://schemas.microsoft.com/office/drawing/2014/main" id="{A54F7E2C-EF05-4D30-9675-D7EADDD40D5F}"/>
+          <p:cNvPr id="1030" name="Picture 6" descr="Laptop Clip Art At Clker Com Vector - Laptop Black And White Clip ...">
+            <a:extLst>
+              <a:ext uri="{FF2B5EF4-FFF2-40B4-BE49-F238E27FC236}">
+                <a16:creationId xmlns:a16="http://schemas.microsoft.com/office/drawing/2014/main" id="{260BCD3F-BD74-4543-B965-10ECD47442A9}"/>
               </a:ext>
             </a:extLst>
           </p:cNvPr>
@@ -7747,8 +7716,8 @@
         </p:blipFill>
         <p:spPr bwMode="auto">
           <a:xfrm>
-            <a:off x="8946107" y="4054361"/>
-            <a:ext cx="1849089" cy="1533392"/>
+            <a:off x="7836444" y="280021"/>
+            <a:ext cx="1632673" cy="1353925"/>
           </a:xfrm>
           <a:prstGeom prst="rect">
             <a:avLst/>
@@ -7765,210 +7734,30 @@
           </a:extLst>
         </p:spPr>
       </p:pic>
-      <p:pic>
-        <p:nvPicPr>
-          <p:cNvPr id="2050" name="Picture 2" descr="Free Free Laptop Cliparts, Download Free Clip Art, Free Clip Art ...">
-            <a:extLst>
-              <a:ext uri="{FF2B5EF4-FFF2-40B4-BE49-F238E27FC236}">
-                <a16:creationId xmlns:a16="http://schemas.microsoft.com/office/drawing/2014/main" id="{2F1D7E14-40B7-4333-9751-1D4C24BCECF9}"/>
-              </a:ext>
-            </a:extLst>
-          </p:cNvPr>
-          <p:cNvPicPr>
-            <a:picLocks noChangeAspect="1" noChangeArrowheads="1"/>
-          </p:cNvPicPr>
-          <p:nvPr/>
-        </p:nvPicPr>
-        <p:blipFill>
-          <a:blip r:embed="rId4">
-            <a:extLst>
-              <a:ext uri="{28A0092B-C50C-407E-A947-70E740481C1C}">
-                <a14:useLocalDpi xmlns:a14="http://schemas.microsoft.com/office/drawing/2010/main" val="0"/>
-              </a:ext>
-            </a:extLst>
-          </a:blip>
-          <a:srcRect/>
-          <a:stretch>
-            <a:fillRect/>
-          </a:stretch>
-        </p:blipFill>
-        <p:spPr bwMode="auto">
-          <a:xfrm>
-            <a:off x="1346757" y="1968079"/>
-            <a:ext cx="1975759" cy="1568063"/>
-          </a:xfrm>
-          <a:prstGeom prst="rect">
-            <a:avLst/>
-          </a:prstGeom>
-          <a:noFill/>
-          <a:extLst>
-            <a:ext uri="{909E8E84-426E-40DD-AFC4-6F175D3DCCD1}">
-              <a14:hiddenFill xmlns:a14="http://schemas.microsoft.com/office/drawing/2010/main">
-                <a:solidFill>
-                  <a:srgbClr val="FFFFFF"/>
-                </a:solidFill>
-              </a14:hiddenFill>
-            </a:ext>
-          </a:extLst>
-        </p:spPr>
-      </p:pic>
-      <p:pic>
-        <p:nvPicPr>
-          <p:cNvPr id="2052" name="Picture 4" descr="Facebook Brand Resources">
-            <a:extLst>
-              <a:ext uri="{FF2B5EF4-FFF2-40B4-BE49-F238E27FC236}">
-                <a16:creationId xmlns:a16="http://schemas.microsoft.com/office/drawing/2014/main" id="{7A69D878-E909-49BD-8643-2C4A6148D6CD}"/>
-              </a:ext>
-            </a:extLst>
-          </p:cNvPr>
-          <p:cNvPicPr>
-            <a:picLocks noChangeAspect="1" noChangeArrowheads="1"/>
-          </p:cNvPicPr>
-          <p:nvPr/>
-        </p:nvPicPr>
-        <p:blipFill>
-          <a:blip r:embed="rId5">
-            <a:extLst>
-              <a:ext uri="{28A0092B-C50C-407E-A947-70E740481C1C}">
-                <a14:useLocalDpi xmlns:a14="http://schemas.microsoft.com/office/drawing/2010/main" val="0"/>
-              </a:ext>
-            </a:extLst>
-          </a:blip>
-          <a:srcRect/>
-          <a:stretch>
-            <a:fillRect/>
-          </a:stretch>
-        </p:blipFill>
-        <p:spPr bwMode="auto">
-          <a:xfrm>
-            <a:off x="3266350" y="3519306"/>
-            <a:ext cx="646331" cy="646331"/>
-          </a:xfrm>
-          <a:prstGeom prst="rect">
-            <a:avLst/>
-          </a:prstGeom>
-          <a:noFill/>
-          <a:extLst>
-            <a:ext uri="{909E8E84-426E-40DD-AFC4-6F175D3DCCD1}">
-              <a14:hiddenFill xmlns:a14="http://schemas.microsoft.com/office/drawing/2010/main">
-                <a:solidFill>
-                  <a:srgbClr val="FFFFFF"/>
-                </a:solidFill>
-              </a14:hiddenFill>
-            </a:ext>
-          </a:extLst>
-        </p:spPr>
-      </p:pic>
-      <p:sp>
-        <p:nvSpPr>
-          <p:cNvPr id="6" name="Arc 5">
-            <a:extLst>
-              <a:ext uri="{FF2B5EF4-FFF2-40B4-BE49-F238E27FC236}">
-                <a16:creationId xmlns:a16="http://schemas.microsoft.com/office/drawing/2014/main" id="{F3F126BB-CFC8-4AAB-BA91-EF2A1E81FAAC}"/>
-              </a:ext>
-            </a:extLst>
-          </p:cNvPr>
-          <p:cNvSpPr/>
-          <p:nvPr/>
-        </p:nvSpPr>
-        <p:spPr>
-          <a:xfrm flipV="1">
-            <a:off x="3064785" y="1803628"/>
-            <a:ext cx="9988784" cy="3671174"/>
-          </a:xfrm>
-          <a:prstGeom prst="arc">
-            <a:avLst>
-              <a:gd name="adj1" fmla="val 10764713"/>
-              <a:gd name="adj2" fmla="val 18709222"/>
-            </a:avLst>
-          </a:prstGeom>
-          <a:ln w="38100">
-            <a:headEnd type="none" w="med" len="med"/>
-            <a:tailEnd type="triangle" w="lg" len="lg"/>
-          </a:ln>
-        </p:spPr>
-        <p:style>
-          <a:lnRef idx="1">
-            <a:schemeClr val="accent1"/>
-          </a:lnRef>
-          <a:fillRef idx="0">
-            <a:schemeClr val="accent1"/>
-          </a:fillRef>
-          <a:effectRef idx="0">
-            <a:schemeClr val="accent1"/>
-          </a:effectRef>
-          <a:fontRef idx="minor">
-            <a:schemeClr val="tx1"/>
-          </a:fontRef>
-        </p:style>
-        <p:txBody>
-          <a:bodyPr rtlCol="0" anchor="ctr"/>
-          <a:lstStyle/>
-          <a:p>
-            <a:pPr algn="ctr"/>
-            <a:endParaRPr lang="en-CA" dirty="0"/>
-          </a:p>
-        </p:txBody>
-      </p:sp>
-      <p:sp>
-        <p:nvSpPr>
-          <p:cNvPr id="7" name="TextBox 6">
-            <a:extLst>
-              <a:ext uri="{FF2B5EF4-FFF2-40B4-BE49-F238E27FC236}">
-                <a16:creationId xmlns:a16="http://schemas.microsoft.com/office/drawing/2014/main" id="{BAC1A465-975D-4218-8A09-B4FE7FE49144}"/>
-              </a:ext>
-            </a:extLst>
-          </p:cNvPr>
-          <p:cNvSpPr txBox="1"/>
-          <p:nvPr/>
-        </p:nvSpPr>
-        <p:spPr>
-          <a:xfrm rot="708815">
-            <a:off x="2572196" y="4849105"/>
-            <a:ext cx="5478845" cy="646331"/>
-          </a:xfrm>
-          <a:prstGeom prst="rect">
-            <a:avLst/>
-          </a:prstGeom>
-          <a:noFill/>
-        </p:spPr>
-        <p:txBody>
-          <a:bodyPr wrap="square" rtlCol="0">
-            <a:spAutoFit/>
-          </a:bodyPr>
-          <a:lstStyle/>
-          <a:p>
-            <a:r>
-              <a:rPr lang="en-CA" dirty="0"/>
-              <a:t>I give them www.gameshow.geoffspielman.com?ip=24.212.142.167</a:t>
-            </a:r>
-          </a:p>
-        </p:txBody>
-      </p:sp>
       <p:cxnSp>
         <p:nvCxnSpPr>
-          <p:cNvPr id="9" name="Straight Arrow Connector 8">
-            <a:extLst>
-              <a:ext uri="{FF2B5EF4-FFF2-40B4-BE49-F238E27FC236}">
-                <a16:creationId xmlns:a16="http://schemas.microsoft.com/office/drawing/2014/main" id="{20ACEA87-24DC-4E77-ABFD-90BCA1E3EE2F}"/>
-              </a:ext>
-            </a:extLst>
-          </p:cNvPr>
-          <p:cNvCxnSpPr>
-            <a:cxnSpLocks/>
-          </p:cNvCxnSpPr>
+          <p:cNvPr id="5" name="Straight Connector 4">
+            <a:extLst>
+              <a:ext uri="{FF2B5EF4-FFF2-40B4-BE49-F238E27FC236}">
+                <a16:creationId xmlns:a16="http://schemas.microsoft.com/office/drawing/2014/main" id="{BF9CACD2-A8C3-491E-BE07-2BE5E2CD73AD}"/>
+              </a:ext>
+            </a:extLst>
+          </p:cNvPr>
+          <p:cNvCxnSpPr/>
           <p:nvPr/>
         </p:nvCxnSpPr>
         <p:spPr>
-          <a:xfrm flipH="1" flipV="1">
-            <a:off x="8634953" y="3983709"/>
-            <a:ext cx="979901" cy="450469"/>
-          </a:xfrm>
-          <a:prstGeom prst="straightConnector1">
+          <a:xfrm>
+            <a:off x="5738677" y="1491343"/>
+            <a:ext cx="0" cy="3875314"/>
+          </a:xfrm>
+          <a:prstGeom prst="line">
             <a:avLst/>
           </a:prstGeom>
           <a:ln w="28575">
-            <a:tailEnd type="triangle"/>
+            <a:solidFill>
+              <a:schemeClr val="accent1"/>
+            </a:solidFill>
           </a:ln>
         </p:spPr>
         <p:style>
@@ -7986,192 +7775,34 @@
           </a:fontRef>
         </p:style>
       </p:cxnSp>
-      <p:sp>
-        <p:nvSpPr>
-          <p:cNvPr id="12" name="TextBox 11">
-            <a:extLst>
-              <a:ext uri="{FF2B5EF4-FFF2-40B4-BE49-F238E27FC236}">
-                <a16:creationId xmlns:a16="http://schemas.microsoft.com/office/drawing/2014/main" id="{49F76250-7EFD-4046-8AD9-C67D014EB8D7}"/>
-              </a:ext>
-            </a:extLst>
-          </p:cNvPr>
-          <p:cNvSpPr txBox="1"/>
-          <p:nvPr/>
-        </p:nvSpPr>
-        <p:spPr>
-          <a:xfrm>
-            <a:off x="6212860" y="991651"/>
-            <a:ext cx="2311139" cy="923330"/>
-          </a:xfrm>
-          <a:prstGeom prst="rect">
-            <a:avLst/>
-          </a:prstGeom>
-          <a:noFill/>
-        </p:spPr>
-        <p:txBody>
-          <a:bodyPr wrap="square" rtlCol="0">
-            <a:spAutoFit/>
-          </a:bodyPr>
-          <a:lstStyle/>
-          <a:p>
-            <a:r>
-              <a:rPr lang="en-CA" dirty="0"/>
-              <a:t>Client gets public content (index, images </a:t>
-            </a:r>
-            <a:r>
-              <a:rPr lang="en-CA" dirty="0" err="1"/>
-              <a:t>etc</a:t>
-            </a:r>
-            <a:r>
-              <a:rPr lang="en-CA" dirty="0"/>
-              <a:t>) from digital ocean </a:t>
-            </a:r>
-          </a:p>
-        </p:txBody>
-      </p:sp>
-      <p:pic>
-        <p:nvPicPr>
-          <p:cNvPr id="11" name="Picture 10">
-            <a:extLst>
-              <a:ext uri="{FF2B5EF4-FFF2-40B4-BE49-F238E27FC236}">
-                <a16:creationId xmlns:a16="http://schemas.microsoft.com/office/drawing/2014/main" id="{B1632617-9153-482F-99B7-8E54F2289BEE}"/>
-              </a:ext>
-            </a:extLst>
-          </p:cNvPr>
-          <p:cNvPicPr>
-            <a:picLocks noChangeAspect="1"/>
-          </p:cNvPicPr>
-          <p:nvPr/>
-        </p:nvPicPr>
-        <p:blipFill>
-          <a:blip r:embed="rId6">
-            <a:clrChange>
-              <a:clrFrom>
-                <a:srgbClr val="000000"/>
-              </a:clrFrom>
-              <a:clrTo>
-                <a:srgbClr val="000000">
-                  <a:alpha val="0"/>
-                </a:srgbClr>
-              </a:clrTo>
-            </a:clrChange>
-          </a:blip>
-          <a:stretch>
-            <a:fillRect/>
-          </a:stretch>
-        </p:blipFill>
-        <p:spPr>
-          <a:xfrm>
-            <a:off x="7963916" y="3488385"/>
-            <a:ext cx="580616" cy="890047"/>
-          </a:xfrm>
-          <a:prstGeom prst="rect">
-            <a:avLst/>
-          </a:prstGeom>
-        </p:spPr>
-      </p:pic>
-      <p:sp>
-        <p:nvSpPr>
-          <p:cNvPr id="17" name="TextBox 16">
-            <a:extLst>
-              <a:ext uri="{FF2B5EF4-FFF2-40B4-BE49-F238E27FC236}">
-                <a16:creationId xmlns:a16="http://schemas.microsoft.com/office/drawing/2014/main" id="{D829789C-D2FA-4964-B3B8-5139751AB539}"/>
-              </a:ext>
-            </a:extLst>
-          </p:cNvPr>
-          <p:cNvSpPr txBox="1"/>
-          <p:nvPr/>
-        </p:nvSpPr>
-        <p:spPr>
-          <a:xfrm>
-            <a:off x="7632581" y="3169712"/>
-            <a:ext cx="1243286" cy="369332"/>
-          </a:xfrm>
-          <a:prstGeom prst="rect">
-            <a:avLst/>
-          </a:prstGeom>
-          <a:noFill/>
-        </p:spPr>
-        <p:txBody>
-          <a:bodyPr wrap="square" rtlCol="0">
-            <a:spAutoFit/>
-          </a:bodyPr>
-          <a:lstStyle/>
-          <a:p>
-            <a:r>
-              <a:rPr lang="en-CA"/>
-              <a:t>DNS Server</a:t>
-            </a:r>
-            <a:endParaRPr lang="en-CA" dirty="0"/>
-          </a:p>
-        </p:txBody>
-      </p:sp>
-      <p:pic>
-        <p:nvPicPr>
-          <p:cNvPr id="18" name="Picture 17">
-            <a:extLst>
-              <a:ext uri="{FF2B5EF4-FFF2-40B4-BE49-F238E27FC236}">
-                <a16:creationId xmlns:a16="http://schemas.microsoft.com/office/drawing/2014/main" id="{481234E0-FD00-4AB6-A6E4-62D149C7D8DB}"/>
-              </a:ext>
-            </a:extLst>
-          </p:cNvPr>
-          <p:cNvPicPr>
-            <a:picLocks noChangeAspect="1"/>
-          </p:cNvPicPr>
-          <p:nvPr/>
-        </p:nvPicPr>
-        <p:blipFill>
-          <a:blip r:embed="rId7">
-            <a:clrChange>
-              <a:clrFrom>
-                <a:srgbClr val="000000"/>
-              </a:clrFrom>
-              <a:clrTo>
-                <a:srgbClr val="000000">
-                  <a:alpha val="0"/>
-                </a:srgbClr>
-              </a:clrTo>
-            </a:clrChange>
-          </a:blip>
-          <a:stretch>
-            <a:fillRect/>
-          </a:stretch>
-        </p:blipFill>
-        <p:spPr>
-          <a:xfrm>
-            <a:off x="4668719" y="3039411"/>
-            <a:ext cx="1818293" cy="542991"/>
-          </a:xfrm>
-          <a:prstGeom prst="rect">
-            <a:avLst/>
-          </a:prstGeom>
-        </p:spPr>
-      </p:pic>
       <p:cxnSp>
         <p:nvCxnSpPr>
-          <p:cNvPr id="21" name="Straight Arrow Connector 20">
-            <a:extLst>
-              <a:ext uri="{FF2B5EF4-FFF2-40B4-BE49-F238E27FC236}">
-                <a16:creationId xmlns:a16="http://schemas.microsoft.com/office/drawing/2014/main" id="{DB9448DA-77CA-4332-8CBF-7209CBBFC28A}"/>
+          <p:cNvPr id="9" name="Straight Connector 8">
+            <a:extLst>
+              <a:ext uri="{FF2B5EF4-FFF2-40B4-BE49-F238E27FC236}">
+                <a16:creationId xmlns:a16="http://schemas.microsoft.com/office/drawing/2014/main" id="{E670D51B-3EFE-40B0-8EFE-090055CE2ADF}"/>
               </a:ext>
             </a:extLst>
           </p:cNvPr>
           <p:cNvCxnSpPr>
             <a:cxnSpLocks/>
-            <a:endCxn id="18" idx="3"/>
           </p:cNvCxnSpPr>
           <p:nvPr/>
         </p:nvCxnSpPr>
         <p:spPr>
-          <a:xfrm flipH="1" flipV="1">
-            <a:off x="6487012" y="3310907"/>
-            <a:ext cx="1311238" cy="450470"/>
-          </a:xfrm>
-          <a:prstGeom prst="straightConnector1">
+          <a:xfrm flipH="1">
+            <a:off x="5895703" y="1491343"/>
+            <a:ext cx="2386148" cy="607423"/>
+          </a:xfrm>
+          <a:prstGeom prst="line">
             <a:avLst/>
           </a:prstGeom>
           <a:ln w="28575">
-            <a:tailEnd type="triangle"/>
+            <a:solidFill>
+              <a:srgbClr val="FFC000"/>
+            </a:solidFill>
+            <a:headEnd type="none" w="lg" len="lg"/>
+            <a:tailEnd type="triangle" w="lg" len="lg"/>
           </a:ln>
         </p:spPr>
         <p:style>
@@ -8189,59 +7820,118 @@
           </a:fontRef>
         </p:style>
       </p:cxnSp>
-      <p:pic>
-        <p:nvPicPr>
-          <p:cNvPr id="2058" name="Picture 10" descr="DigitalOcean - Wikipedia">
-            <a:extLst>
-              <a:ext uri="{FF2B5EF4-FFF2-40B4-BE49-F238E27FC236}">
-                <a16:creationId xmlns:a16="http://schemas.microsoft.com/office/drawing/2014/main" id="{E0D2E34C-73D0-4949-AA2C-746BE6140F69}"/>
-              </a:ext>
-            </a:extLst>
-          </p:cNvPr>
-          <p:cNvPicPr>
-            <a:picLocks noChangeAspect="1" noChangeArrowheads="1"/>
-          </p:cNvPicPr>
-          <p:nvPr/>
-        </p:nvPicPr>
-        <p:blipFill>
-          <a:blip r:embed="rId8">
-            <a:extLst>
-              <a:ext uri="{28A0092B-C50C-407E-A947-70E740481C1C}">
-                <a14:useLocalDpi xmlns:a14="http://schemas.microsoft.com/office/drawing/2010/main" val="0"/>
-              </a:ext>
-            </a:extLst>
-          </a:blip>
-          <a:srcRect/>
-          <a:stretch>
-            <a:fillRect/>
-          </a:stretch>
-        </p:blipFill>
-        <p:spPr bwMode="auto">
-          <a:xfrm>
-            <a:off x="4334916" y="1001158"/>
-            <a:ext cx="922884" cy="922884"/>
+      <p:sp>
+        <p:nvSpPr>
+          <p:cNvPr id="8" name="TextBox 7">
+            <a:extLst>
+              <a:ext uri="{FF2B5EF4-FFF2-40B4-BE49-F238E27FC236}">
+                <a16:creationId xmlns:a16="http://schemas.microsoft.com/office/drawing/2014/main" id="{65DC4DAD-CC47-4B42-99C6-82E0969D7768}"/>
+              </a:ext>
+            </a:extLst>
+          </p:cNvPr>
+          <p:cNvSpPr txBox="1"/>
+          <p:nvPr/>
+        </p:nvSpPr>
+        <p:spPr>
+          <a:xfrm rot="20682798">
+            <a:off x="6467630" y="1696310"/>
+            <a:ext cx="1943468" cy="369332"/>
           </a:xfrm>
           <a:prstGeom prst="rect">
             <a:avLst/>
           </a:prstGeom>
           <a:noFill/>
-          <a:extLst>
-            <a:ext uri="{909E8E84-426E-40DD-AFC4-6F175D3DCCD1}">
-              <a14:hiddenFill xmlns:a14="http://schemas.microsoft.com/office/drawing/2010/main">
-                <a:solidFill>
-                  <a:srgbClr val="FFFFFF"/>
-                </a:solidFill>
-              </a14:hiddenFill>
-            </a:ext>
-          </a:extLst>
-        </p:spPr>
-      </p:pic>
+        </p:spPr>
+        <p:txBody>
+          <a:bodyPr wrap="square" rtlCol="0">
+            <a:spAutoFit/>
+          </a:bodyPr>
+          <a:lstStyle/>
+          <a:p>
+            <a:r>
+              <a:rPr lang="en-CA" dirty="0" err="1"/>
+              <a:t>gameDataRequest</a:t>
+            </a:r>
+            <a:endParaRPr lang="en-CA" dirty="0"/>
+          </a:p>
+        </p:txBody>
+      </p:sp>
+      <p:sp>
+        <p:nvSpPr>
+          <p:cNvPr id="13" name="TextBox 12">
+            <a:extLst>
+              <a:ext uri="{FF2B5EF4-FFF2-40B4-BE49-F238E27FC236}">
+                <a16:creationId xmlns:a16="http://schemas.microsoft.com/office/drawing/2014/main" id="{06ED55D2-2DBD-4AF4-94D6-1CE632A0A946}"/>
+              </a:ext>
+            </a:extLst>
+          </p:cNvPr>
+          <p:cNvSpPr txBox="1"/>
+          <p:nvPr/>
+        </p:nvSpPr>
+        <p:spPr>
+          <a:xfrm>
+            <a:off x="9469117" y="403648"/>
+            <a:ext cx="2690588" cy="646331"/>
+          </a:xfrm>
+          <a:prstGeom prst="rect">
+            <a:avLst/>
+          </a:prstGeom>
+          <a:noFill/>
+        </p:spPr>
+        <p:txBody>
+          <a:bodyPr wrap="square" rtlCol="0">
+            <a:spAutoFit/>
+          </a:bodyPr>
+          <a:lstStyle/>
+          <a:p>
+            <a:r>
+              <a:rPr lang="en-CA" dirty="0"/>
+              <a:t>Technician clicks ‘request current data’</a:t>
+            </a:r>
+          </a:p>
+        </p:txBody>
+      </p:sp>
+      <p:sp>
+        <p:nvSpPr>
+          <p:cNvPr id="12" name="TextBox 11">
+            <a:extLst>
+              <a:ext uri="{FF2B5EF4-FFF2-40B4-BE49-F238E27FC236}">
+                <a16:creationId xmlns:a16="http://schemas.microsoft.com/office/drawing/2014/main" id="{CBCC5FC8-8483-4274-96CA-CF87DC104B93}"/>
+              </a:ext>
+            </a:extLst>
+          </p:cNvPr>
+          <p:cNvSpPr txBox="1"/>
+          <p:nvPr/>
+        </p:nvSpPr>
+        <p:spPr>
+          <a:xfrm>
+            <a:off x="32295" y="0"/>
+            <a:ext cx="4754309" cy="461665"/>
+          </a:xfrm>
+          <a:prstGeom prst="rect">
+            <a:avLst/>
+          </a:prstGeom>
+          <a:noFill/>
+        </p:spPr>
+        <p:txBody>
+          <a:bodyPr wrap="square" rtlCol="0">
+            <a:spAutoFit/>
+          </a:bodyPr>
+          <a:lstStyle/>
+          <a:p>
+            <a:r>
+              <a:rPr lang="en-CA" sz="2400" b="1" dirty="0"/>
+              <a:t>Technician request fresh data</a:t>
+            </a:r>
+          </a:p>
+        </p:txBody>
+      </p:sp>
       <p:cxnSp>
         <p:nvCxnSpPr>
-          <p:cNvPr id="24" name="Straight Arrow Connector 23">
-            <a:extLst>
-              <a:ext uri="{FF2B5EF4-FFF2-40B4-BE49-F238E27FC236}">
-                <a16:creationId xmlns:a16="http://schemas.microsoft.com/office/drawing/2014/main" id="{44136FD6-B266-4EC7-8849-B5344E7A6DC6}"/>
+          <p:cNvPr id="14" name="Straight Connector 13">
+            <a:extLst>
+              <a:ext uri="{FF2B5EF4-FFF2-40B4-BE49-F238E27FC236}">
+                <a16:creationId xmlns:a16="http://schemas.microsoft.com/office/drawing/2014/main" id="{0B168BB9-2FFE-4390-A062-8727EF70FE7B}"/>
               </a:ext>
             </a:extLst>
           </p:cNvPr>
@@ -8251,15 +7941,19 @@
           <p:nvPr/>
         </p:nvCxnSpPr>
         <p:spPr>
-          <a:xfrm flipH="1" flipV="1">
-            <a:off x="5359389" y="2148405"/>
-            <a:ext cx="385472" cy="826725"/>
-          </a:xfrm>
-          <a:prstGeom prst="straightConnector1">
+          <a:xfrm>
+            <a:off x="5895703" y="2821577"/>
+            <a:ext cx="2616701" cy="958571"/>
+          </a:xfrm>
+          <a:prstGeom prst="line">
             <a:avLst/>
           </a:prstGeom>
           <a:ln w="28575">
-            <a:tailEnd type="triangle"/>
+            <a:solidFill>
+              <a:srgbClr val="92D050"/>
+            </a:solidFill>
+            <a:headEnd type="none" w="lg" len="lg"/>
+            <a:tailEnd type="triangle" w="lg" len="lg"/>
           </a:ln>
         </p:spPr>
         <p:style>
@@ -8279,61 +7973,10 @@
       </p:cxnSp>
       <p:sp>
         <p:nvSpPr>
-          <p:cNvPr id="28" name="Arc 27">
-            <a:extLst>
-              <a:ext uri="{FF2B5EF4-FFF2-40B4-BE49-F238E27FC236}">
-                <a16:creationId xmlns:a16="http://schemas.microsoft.com/office/drawing/2014/main" id="{C7257964-613E-4432-A46F-B23F51E26DF4}"/>
-              </a:ext>
-            </a:extLst>
-          </p:cNvPr>
-          <p:cNvSpPr/>
-          <p:nvPr/>
-        </p:nvSpPr>
-        <p:spPr>
-          <a:xfrm rot="13889773" flipH="1" flipV="1">
-            <a:off x="5243741" y="1326305"/>
-            <a:ext cx="5193195" cy="3739505"/>
-          </a:xfrm>
-          <a:prstGeom prst="arc">
-            <a:avLst>
-              <a:gd name="adj1" fmla="val 11463417"/>
-              <a:gd name="adj2" fmla="val 19922351"/>
-            </a:avLst>
-          </a:prstGeom>
-          <a:ln w="38100">
-            <a:headEnd type="none" w="med" len="med"/>
-            <a:tailEnd type="triangle" w="lg" len="lg"/>
-          </a:ln>
-        </p:spPr>
-        <p:style>
-          <a:lnRef idx="1">
-            <a:schemeClr val="accent1"/>
-          </a:lnRef>
-          <a:fillRef idx="0">
-            <a:schemeClr val="accent1"/>
-          </a:fillRef>
-          <a:effectRef idx="0">
-            <a:schemeClr val="accent1"/>
-          </a:effectRef>
-          <a:fontRef idx="minor">
-            <a:schemeClr val="tx1"/>
-          </a:fontRef>
-        </p:style>
-        <p:txBody>
-          <a:bodyPr rtlCol="0" anchor="ctr"/>
-          <a:lstStyle/>
-          <a:p>
-            <a:pPr algn="ctr"/>
-            <a:endParaRPr lang="en-CA"/>
-          </a:p>
-        </p:txBody>
-      </p:sp>
-      <p:sp>
-        <p:nvSpPr>
-          <p:cNvPr id="29" name="TextBox 28">
-            <a:extLst>
-              <a:ext uri="{FF2B5EF4-FFF2-40B4-BE49-F238E27FC236}">
-                <a16:creationId xmlns:a16="http://schemas.microsoft.com/office/drawing/2014/main" id="{0E3641A7-21FF-4407-ACC9-920FB9C11AFA}"/>
+          <p:cNvPr id="15" name="TextBox 14">
+            <a:extLst>
+              <a:ext uri="{FF2B5EF4-FFF2-40B4-BE49-F238E27FC236}">
+                <a16:creationId xmlns:a16="http://schemas.microsoft.com/office/drawing/2014/main" id="{F227B532-2DB3-4F25-8AAF-6F03FD75AE9C}"/>
               </a:ext>
             </a:extLst>
           </p:cNvPr>
@@ -8341,9 +7984,9 @@
           <p:nvPr/>
         </p:nvSpPr>
         <p:spPr>
-          <a:xfrm>
-            <a:off x="4674877" y="3539535"/>
-            <a:ext cx="2311139" cy="646331"/>
+          <a:xfrm rot="1248694">
+            <a:off x="6229854" y="3327229"/>
+            <a:ext cx="2154027" cy="369332"/>
           </a:xfrm>
           <a:prstGeom prst="rect">
             <a:avLst/>
@@ -8357,59 +8000,19 @@
           <a:lstStyle/>
           <a:p>
             <a:r>
-              <a:rPr lang="en-CA" dirty="0"/>
-              <a:t>Worker: no SSL on *gameshow</a:t>
-            </a:r>
-          </a:p>
-        </p:txBody>
-      </p:sp>
-      <p:pic>
-        <p:nvPicPr>
-          <p:cNvPr id="25" name="Picture 24">
-            <a:extLst>
-              <a:ext uri="{FF2B5EF4-FFF2-40B4-BE49-F238E27FC236}">
-                <a16:creationId xmlns:a16="http://schemas.microsoft.com/office/drawing/2014/main" id="{8F645A89-6FC5-40B9-8E1D-04D66B7ACAAA}"/>
-              </a:ext>
-            </a:extLst>
-          </p:cNvPr>
-          <p:cNvPicPr>
-            <a:picLocks noChangeAspect="1"/>
-          </p:cNvPicPr>
-          <p:nvPr/>
-        </p:nvPicPr>
-        <p:blipFill>
-          <a:blip r:embed="rId9">
-            <a:clrChange>
-              <a:clrFrom>
-                <a:srgbClr val="000000"/>
-              </a:clrFrom>
-              <a:clrTo>
-                <a:srgbClr val="000000">
-                  <a:alpha val="0"/>
-                </a:srgbClr>
-              </a:clrTo>
-            </a:clrChange>
-          </a:blip>
-          <a:stretch>
-            <a:fillRect/>
-          </a:stretch>
-        </p:blipFill>
-        <p:spPr>
-          <a:xfrm>
-            <a:off x="10405987" y="3920693"/>
-            <a:ext cx="903323" cy="1026970"/>
-          </a:xfrm>
-          <a:prstGeom prst="rect">
-            <a:avLst/>
-          </a:prstGeom>
-        </p:spPr>
-      </p:pic>
-      <p:sp>
-        <p:nvSpPr>
-          <p:cNvPr id="32" name="TextBox 31">
-            <a:extLst>
-              <a:ext uri="{FF2B5EF4-FFF2-40B4-BE49-F238E27FC236}">
-                <a16:creationId xmlns:a16="http://schemas.microsoft.com/office/drawing/2014/main" id="{DB0590A1-23F4-42DE-B060-F05E0295FDD7}"/>
+              <a:rPr lang="en-CA" dirty="0" err="1"/>
+              <a:t>gameDataDelivery</a:t>
+            </a:r>
+            <a:endParaRPr lang="en-CA" dirty="0"/>
+          </a:p>
+        </p:txBody>
+      </p:sp>
+      <p:sp>
+        <p:nvSpPr>
+          <p:cNvPr id="17" name="TextBox 16">
+            <a:extLst>
+              <a:ext uri="{FF2B5EF4-FFF2-40B4-BE49-F238E27FC236}">
+                <a16:creationId xmlns:a16="http://schemas.microsoft.com/office/drawing/2014/main" id="{57FCC26E-B2CC-4059-A9DF-65C62C29FF99}"/>
               </a:ext>
             </a:extLst>
           </p:cNvPr>
@@ -8418,8 +8021,8 @@
         </p:nvSpPr>
         <p:spPr>
           <a:xfrm>
-            <a:off x="10654472" y="4907270"/>
-            <a:ext cx="1468685" cy="646331"/>
+            <a:off x="3491263" y="2604785"/>
+            <a:ext cx="2962061" cy="369332"/>
           </a:xfrm>
           <a:prstGeom prst="rect">
             <a:avLst/>
@@ -8434,159 +8037,15 @@
           <a:p>
             <a:r>
               <a:rPr lang="en-CA" dirty="0"/>
-              <a:t>Parse </a:t>
-            </a:r>
-            <a:r>
-              <a:rPr lang="en-CA" dirty="0" err="1"/>
-              <a:t>url</a:t>
-            </a:r>
-            <a:r>
-              <a:rPr lang="en-CA" dirty="0"/>
-              <a:t> for my IP address</a:t>
-            </a:r>
-          </a:p>
-        </p:txBody>
-      </p:sp>
-      <p:sp>
-        <p:nvSpPr>
-          <p:cNvPr id="33" name="Arc 32">
-            <a:extLst>
-              <a:ext uri="{FF2B5EF4-FFF2-40B4-BE49-F238E27FC236}">
-                <a16:creationId xmlns:a16="http://schemas.microsoft.com/office/drawing/2014/main" id="{3EEEFB70-3E1C-4FC6-8BF9-BA6CB948DB2B}"/>
-              </a:ext>
-            </a:extLst>
-          </p:cNvPr>
-          <p:cNvSpPr/>
-          <p:nvPr/>
-        </p:nvSpPr>
-        <p:spPr>
-          <a:xfrm flipH="1" flipV="1">
-            <a:off x="1396804" y="1270247"/>
-            <a:ext cx="9988784" cy="5377895"/>
-          </a:xfrm>
-          <a:prstGeom prst="arc">
-            <a:avLst>
-              <a:gd name="adj1" fmla="val 11931196"/>
-              <a:gd name="adj2" fmla="val 213157"/>
-            </a:avLst>
-          </a:prstGeom>
-          <a:ln w="38100">
-            <a:solidFill>
-              <a:srgbClr val="FF0000"/>
-            </a:solidFill>
-            <a:headEnd type="triangle" w="med" len="med"/>
-            <a:tailEnd type="triangle" w="med" len="med"/>
-          </a:ln>
-        </p:spPr>
-        <p:style>
-          <a:lnRef idx="1">
-            <a:schemeClr val="accent1"/>
-          </a:lnRef>
-          <a:fillRef idx="0">
-            <a:schemeClr val="accent1"/>
-          </a:fillRef>
-          <a:effectRef idx="0">
-            <a:schemeClr val="accent1"/>
-          </a:effectRef>
-          <a:fontRef idx="minor">
-            <a:schemeClr val="tx1"/>
-          </a:fontRef>
-        </p:style>
-        <p:txBody>
-          <a:bodyPr rtlCol="0" anchor="ctr"/>
-          <a:lstStyle/>
-          <a:p>
-            <a:pPr algn="ctr"/>
-            <a:endParaRPr lang="en-CA" dirty="0"/>
-          </a:p>
-        </p:txBody>
-      </p:sp>
-      <p:sp>
-        <p:nvSpPr>
-          <p:cNvPr id="34" name="TextBox 33">
-            <a:extLst>
-              <a:ext uri="{FF2B5EF4-FFF2-40B4-BE49-F238E27FC236}">
-                <a16:creationId xmlns:a16="http://schemas.microsoft.com/office/drawing/2014/main" id="{F59675D6-D1BD-47DB-8662-F2B23CA93E81}"/>
-              </a:ext>
-            </a:extLst>
-          </p:cNvPr>
-          <p:cNvSpPr txBox="1"/>
-          <p:nvPr/>
-        </p:nvSpPr>
-        <p:spPr>
-          <a:xfrm rot="708815">
-            <a:off x="2601010" y="5969142"/>
-            <a:ext cx="5478845" cy="369332"/>
-          </a:xfrm>
-          <a:prstGeom prst="rect">
-            <a:avLst/>
-          </a:prstGeom>
-          <a:noFill/>
-        </p:spPr>
-        <p:txBody>
-          <a:bodyPr wrap="square" rtlCol="0">
-            <a:spAutoFit/>
-          </a:bodyPr>
-          <a:lstStyle/>
-          <a:p>
-            <a:r>
-              <a:rPr lang="en-CA" dirty="0"/>
-              <a:t>Socket connection @ 24.212.142.167:3000</a:t>
-            </a:r>
-          </a:p>
-        </p:txBody>
-      </p:sp>
-      <p:pic>
-        <p:nvPicPr>
-          <p:cNvPr id="2062" name="Picture 14">
-            <a:extLst>
-              <a:ext uri="{FF2B5EF4-FFF2-40B4-BE49-F238E27FC236}">
-                <a16:creationId xmlns:a16="http://schemas.microsoft.com/office/drawing/2014/main" id="{3436B604-3FFF-47C9-BBAF-AF7A9175D956}"/>
-              </a:ext>
-            </a:extLst>
-          </p:cNvPr>
-          <p:cNvPicPr>
-            <a:picLocks noChangeAspect="1" noChangeArrowheads="1"/>
-          </p:cNvPicPr>
-          <p:nvPr/>
-        </p:nvPicPr>
-        <p:blipFill>
-          <a:blip r:embed="rId10">
-            <a:extLst>
-              <a:ext uri="{28A0092B-C50C-407E-A947-70E740481C1C}">
-                <a14:useLocalDpi xmlns:a14="http://schemas.microsoft.com/office/drawing/2010/main" val="0"/>
-              </a:ext>
-            </a:extLst>
-          </a:blip>
-          <a:srcRect/>
-          <a:stretch>
-            <a:fillRect/>
-          </a:stretch>
-        </p:blipFill>
-        <p:spPr bwMode="auto">
-          <a:xfrm>
-            <a:off x="122485" y="2944310"/>
-            <a:ext cx="1202435" cy="733192"/>
-          </a:xfrm>
-          <a:prstGeom prst="rect">
-            <a:avLst/>
-          </a:prstGeom>
-          <a:noFill/>
-          <a:extLst>
-            <a:ext uri="{909E8E84-426E-40DD-AFC4-6F175D3DCCD1}">
-              <a14:hiddenFill xmlns:a14="http://schemas.microsoft.com/office/drawing/2010/main">
-                <a:solidFill>
-                  <a:srgbClr val="FFFFFF"/>
-                </a:solidFill>
-              </a14:hiddenFill>
-            </a:ext>
-          </a:extLst>
-        </p:spPr>
-      </p:pic>
+              <a:t>Only sent to host:</a:t>
+            </a:r>
+          </a:p>
+        </p:txBody>
+      </p:sp>
     </p:spTree>
     <p:extLst>
       <p:ext uri="{BB962C8B-B14F-4D97-AF65-F5344CB8AC3E}">
-        <p14:creationId xmlns:p14="http://schemas.microsoft.com/office/powerpoint/2010/main" val="1160604219"/>
+        <p14:creationId xmlns:p14="http://schemas.microsoft.com/office/powerpoint/2010/main" val="1645236886"/>
       </p:ext>
     </p:extLst>
   </p:cSld>
@@ -8613,195 +8072,403 @@
           <a:chExt cx="0" cy="0"/>
         </a:xfrm>
       </p:grpSpPr>
-      <p:sp>
-        <p:nvSpPr>
-          <p:cNvPr id="2" name="Title 1">
-            <a:extLst>
-              <a:ext uri="{FF2B5EF4-FFF2-40B4-BE49-F238E27FC236}">
-                <a16:creationId xmlns:a16="http://schemas.microsoft.com/office/drawing/2014/main" id="{F834305A-B403-4127-8A5F-0ACDF6A6BB40}"/>
-              </a:ext>
-            </a:extLst>
-          </p:cNvPr>
-          <p:cNvSpPr>
-            <a:spLocks noGrp="1"/>
-          </p:cNvSpPr>
-          <p:nvPr>
-            <p:ph type="title"/>
-          </p:nvPr>
-        </p:nvSpPr>
-        <p:spPr>
-          <a:xfrm>
-            <a:off x="150223" y="0"/>
-            <a:ext cx="7896497" cy="740864"/>
-          </a:xfrm>
-        </p:spPr>
-        <p:txBody>
-          <a:bodyPr/>
-          <a:lstStyle/>
+      <p:pic>
+        <p:nvPicPr>
+          <p:cNvPr id="1028" name="Picture 4" descr="Dedicated Server PNG Image | Server, Dedication, Png images">
+            <a:extLst>
+              <a:ext uri="{FF2B5EF4-FFF2-40B4-BE49-F238E27FC236}">
+                <a16:creationId xmlns:a16="http://schemas.microsoft.com/office/drawing/2014/main" id="{B259F46C-6CBA-4D56-93C3-3D41AC3A6B13}"/>
+              </a:ext>
+            </a:extLst>
+          </p:cNvPr>
+          <p:cNvPicPr>
+            <a:picLocks noChangeAspect="1" noChangeArrowheads="1"/>
+          </p:cNvPicPr>
+          <p:nvPr/>
+        </p:nvPicPr>
+        <p:blipFill>
+          <a:blip r:embed="rId2">
+            <a:extLst>
+              <a:ext uri="{28A0092B-C50C-407E-A947-70E740481C1C}">
+                <a14:useLocalDpi xmlns:a14="http://schemas.microsoft.com/office/drawing/2010/main" val="0"/>
+              </a:ext>
+            </a:extLst>
+          </a:blip>
+          <a:srcRect/>
+          <a:stretch>
+            <a:fillRect/>
+          </a:stretch>
+        </p:blipFill>
+        <p:spPr bwMode="auto">
+          <a:xfrm>
+            <a:off x="5268415" y="280021"/>
+            <a:ext cx="757916" cy="1021909"/>
+          </a:xfrm>
+          <a:prstGeom prst="rect">
+            <a:avLst/>
+          </a:prstGeom>
+          <a:noFill/>
+          <a:extLst>
+            <a:ext uri="{909E8E84-426E-40DD-AFC4-6F175D3DCCD1}">
+              <a14:hiddenFill xmlns:a14="http://schemas.microsoft.com/office/drawing/2010/main">
+                <a:solidFill>
+                  <a:srgbClr val="FFFFFF"/>
+                </a:solidFill>
+              </a14:hiddenFill>
+            </a:ext>
+          </a:extLst>
+        </p:spPr>
+      </p:pic>
+      <p:pic>
+        <p:nvPicPr>
+          <p:cNvPr id="1030" name="Picture 6" descr="Laptop Clip Art At Clker Com Vector - Laptop Black And White Clip ...">
+            <a:extLst>
+              <a:ext uri="{FF2B5EF4-FFF2-40B4-BE49-F238E27FC236}">
+                <a16:creationId xmlns:a16="http://schemas.microsoft.com/office/drawing/2014/main" id="{260BCD3F-BD74-4543-B965-10ECD47442A9}"/>
+              </a:ext>
+            </a:extLst>
+          </p:cNvPr>
+          <p:cNvPicPr>
+            <a:picLocks noChangeAspect="1" noChangeArrowheads="1"/>
+          </p:cNvPicPr>
+          <p:nvPr/>
+        </p:nvPicPr>
+        <p:blipFill>
+          <a:blip r:embed="rId3">
+            <a:clrChange>
+              <a:clrFrom>
+                <a:srgbClr val="F6F6F6"/>
+              </a:clrFrom>
+              <a:clrTo>
+                <a:srgbClr val="F6F6F6">
+                  <a:alpha val="0"/>
+                </a:srgbClr>
+              </a:clrTo>
+            </a:clrChange>
+            <a:extLst>
+              <a:ext uri="{28A0092B-C50C-407E-A947-70E740481C1C}">
+                <a14:useLocalDpi xmlns:a14="http://schemas.microsoft.com/office/drawing/2010/main" val="0"/>
+              </a:ext>
+            </a:extLst>
+          </a:blip>
+          <a:srcRect/>
+          <a:stretch>
+            <a:fillRect/>
+          </a:stretch>
+        </p:blipFill>
+        <p:spPr bwMode="auto">
+          <a:xfrm>
+            <a:off x="7836444" y="280021"/>
+            <a:ext cx="1632673" cy="1353925"/>
+          </a:xfrm>
+          <a:prstGeom prst="rect">
+            <a:avLst/>
+          </a:prstGeom>
+          <a:noFill/>
+          <a:extLst>
+            <a:ext uri="{909E8E84-426E-40DD-AFC4-6F175D3DCCD1}">
+              <a14:hiddenFill xmlns:a14="http://schemas.microsoft.com/office/drawing/2010/main">
+                <a:solidFill>
+                  <a:srgbClr val="FFFFFF"/>
+                </a:solidFill>
+              </a14:hiddenFill>
+            </a:ext>
+          </a:extLst>
+        </p:spPr>
+      </p:pic>
+      <p:cxnSp>
+        <p:nvCxnSpPr>
+          <p:cNvPr id="5" name="Straight Connector 4">
+            <a:extLst>
+              <a:ext uri="{FF2B5EF4-FFF2-40B4-BE49-F238E27FC236}">
+                <a16:creationId xmlns:a16="http://schemas.microsoft.com/office/drawing/2014/main" id="{BF9CACD2-A8C3-491E-BE07-2BE5E2CD73AD}"/>
+              </a:ext>
+            </a:extLst>
+          </p:cNvPr>
+          <p:cNvCxnSpPr/>
+          <p:nvPr/>
+        </p:nvCxnSpPr>
+        <p:spPr>
+          <a:xfrm>
+            <a:off x="5738677" y="1491343"/>
+            <a:ext cx="0" cy="3875314"/>
+          </a:xfrm>
+          <a:prstGeom prst="line">
+            <a:avLst/>
+          </a:prstGeom>
+          <a:ln w="28575">
+            <a:solidFill>
+              <a:schemeClr val="accent1"/>
+            </a:solidFill>
+          </a:ln>
+        </p:spPr>
+        <p:style>
+          <a:lnRef idx="1">
+            <a:schemeClr val="accent1"/>
+          </a:lnRef>
+          <a:fillRef idx="0">
+            <a:schemeClr val="accent1"/>
+          </a:fillRef>
+          <a:effectRef idx="0">
+            <a:schemeClr val="accent1"/>
+          </a:effectRef>
+          <a:fontRef idx="minor">
+            <a:schemeClr val="tx1"/>
+          </a:fontRef>
+        </p:style>
+      </p:cxnSp>
+      <p:cxnSp>
+        <p:nvCxnSpPr>
+          <p:cNvPr id="9" name="Straight Connector 8">
+            <a:extLst>
+              <a:ext uri="{FF2B5EF4-FFF2-40B4-BE49-F238E27FC236}">
+                <a16:creationId xmlns:a16="http://schemas.microsoft.com/office/drawing/2014/main" id="{E670D51B-3EFE-40B0-8EFE-090055CE2ADF}"/>
+              </a:ext>
+            </a:extLst>
+          </p:cNvPr>
+          <p:cNvCxnSpPr>
+            <a:cxnSpLocks/>
+          </p:cNvCxnSpPr>
+          <p:nvPr/>
+        </p:nvCxnSpPr>
+        <p:spPr>
+          <a:xfrm flipH="1">
+            <a:off x="5895703" y="1491343"/>
+            <a:ext cx="2386148" cy="607423"/>
+          </a:xfrm>
+          <a:prstGeom prst="line">
+            <a:avLst/>
+          </a:prstGeom>
+          <a:ln w="28575">
+            <a:solidFill>
+              <a:srgbClr val="FFC000"/>
+            </a:solidFill>
+            <a:headEnd type="none" w="lg" len="lg"/>
+            <a:tailEnd type="triangle" w="lg" len="lg"/>
+          </a:ln>
+        </p:spPr>
+        <p:style>
+          <a:lnRef idx="1">
+            <a:schemeClr val="accent1"/>
+          </a:lnRef>
+          <a:fillRef idx="0">
+            <a:schemeClr val="accent1"/>
+          </a:fillRef>
+          <a:effectRef idx="0">
+            <a:schemeClr val="accent1"/>
+          </a:effectRef>
+          <a:fontRef idx="minor">
+            <a:schemeClr val="tx1"/>
+          </a:fontRef>
+        </p:style>
+      </p:cxnSp>
+      <p:sp>
+        <p:nvSpPr>
+          <p:cNvPr id="8" name="TextBox 7">
+            <a:extLst>
+              <a:ext uri="{FF2B5EF4-FFF2-40B4-BE49-F238E27FC236}">
+                <a16:creationId xmlns:a16="http://schemas.microsoft.com/office/drawing/2014/main" id="{65DC4DAD-CC47-4B42-99C6-82E0969D7768}"/>
+              </a:ext>
+            </a:extLst>
+          </p:cNvPr>
+          <p:cNvSpPr txBox="1"/>
+          <p:nvPr/>
+        </p:nvSpPr>
+        <p:spPr>
+          <a:xfrm rot="20682798">
+            <a:off x="6273941" y="1630193"/>
+            <a:ext cx="2587482" cy="646331"/>
+          </a:xfrm>
+          <a:prstGeom prst="rect">
+            <a:avLst/>
+          </a:prstGeom>
+          <a:noFill/>
+        </p:spPr>
+        <p:txBody>
+          <a:bodyPr wrap="square" rtlCol="0">
+            <a:spAutoFit/>
+          </a:bodyPr>
+          <a:lstStyle/>
+          <a:p>
+            <a:r>
+              <a:rPr lang="en-CA" dirty="0" err="1"/>
+              <a:t>nameChangeRequest</a:t>
+            </a:r>
+            <a:endParaRPr lang="en-CA" dirty="0"/>
+          </a:p>
           <a:p>
             <a:r>
               <a:rPr lang="en-CA" dirty="0"/>
-              <a:t>Worker Threw an Exception</a:t>
-            </a:r>
-          </a:p>
-        </p:txBody>
-      </p:sp>
-      <p:sp>
-        <p:nvSpPr>
-          <p:cNvPr id="3" name="Content Placeholder 2">
-            <a:extLst>
-              <a:ext uri="{FF2B5EF4-FFF2-40B4-BE49-F238E27FC236}">
-                <a16:creationId xmlns:a16="http://schemas.microsoft.com/office/drawing/2014/main" id="{0AAB999F-6D84-41DC-8140-C86A79AA1013}"/>
-              </a:ext>
-            </a:extLst>
-          </p:cNvPr>
-          <p:cNvSpPr>
-            <a:spLocks noGrp="1"/>
-          </p:cNvSpPr>
-          <p:nvPr>
-            <p:ph idx="1"/>
-          </p:nvPr>
-        </p:nvSpPr>
-        <p:spPr>
-          <a:xfrm>
-            <a:off x="315686" y="815431"/>
-            <a:ext cx="10515600" cy="4351338"/>
-          </a:xfrm>
-        </p:spPr>
-        <p:txBody>
-          <a:bodyPr>
-            <a:normAutofit lnSpcReduction="10000"/>
+              <a:t>Or </a:t>
+            </a:r>
+            <a:r>
+              <a:rPr lang="en-CA" dirty="0" err="1"/>
+              <a:t>scoreChangeRequest</a:t>
+            </a:r>
+            <a:endParaRPr lang="en-CA" dirty="0"/>
+          </a:p>
+        </p:txBody>
+      </p:sp>
+      <p:sp>
+        <p:nvSpPr>
+          <p:cNvPr id="13" name="TextBox 12">
+            <a:extLst>
+              <a:ext uri="{FF2B5EF4-FFF2-40B4-BE49-F238E27FC236}">
+                <a16:creationId xmlns:a16="http://schemas.microsoft.com/office/drawing/2014/main" id="{06ED55D2-2DBD-4AF4-94D6-1CE632A0A946}"/>
+              </a:ext>
+            </a:extLst>
+          </p:cNvPr>
+          <p:cNvSpPr txBox="1"/>
+          <p:nvPr/>
+        </p:nvSpPr>
+        <p:spPr>
+          <a:xfrm>
+            <a:off x="9469117" y="403648"/>
+            <a:ext cx="2690588" cy="646331"/>
+          </a:xfrm>
+          <a:prstGeom prst="rect">
+            <a:avLst/>
+          </a:prstGeom>
+          <a:noFill/>
+        </p:spPr>
+        <p:txBody>
+          <a:bodyPr wrap="square" rtlCol="0">
+            <a:spAutoFit/>
           </a:bodyPr>
           <a:lstStyle/>
           <a:p>
-            <a:pPr fontAlgn="t"/>
-            <a:r>
-              <a:rPr lang="en-CA" b="1" dirty="0"/>
-              <a:t>Request URL: </a:t>
-            </a:r>
-          </a:p>
-          <a:p>
-            <a:pPr marL="457200" lvl="1" indent="0" latinLnBrk="1">
-              <a:buNone/>
-            </a:pPr>
-            <a:r>
-              <a:rPr lang="en-CA" dirty="0">
-                <a:hlinkClick r:id="rId2"/>
-              </a:rPr>
-              <a:t>https://gameshow.geoffspielman.com/gamesocket/?ip=24.212.142.167&amp;EIO=3&amp;transport=polling&amp;t=N7C6_EQ</a:t>
+            <a:r>
+              <a:rPr lang="en-CA" dirty="0"/>
+              <a:t>Technician clicks relevant button</a:t>
+            </a:r>
+          </a:p>
+        </p:txBody>
+      </p:sp>
+      <p:sp>
+        <p:nvSpPr>
+          <p:cNvPr id="12" name="TextBox 11">
+            <a:extLst>
+              <a:ext uri="{FF2B5EF4-FFF2-40B4-BE49-F238E27FC236}">
+                <a16:creationId xmlns:a16="http://schemas.microsoft.com/office/drawing/2014/main" id="{CBCC5FC8-8483-4274-96CA-CF87DC104B93}"/>
+              </a:ext>
+            </a:extLst>
+          </p:cNvPr>
+          <p:cNvSpPr txBox="1"/>
+          <p:nvPr/>
+        </p:nvSpPr>
+        <p:spPr>
+          <a:xfrm>
+            <a:off x="32295" y="0"/>
+            <a:ext cx="4754309" cy="461665"/>
+          </a:xfrm>
+          <a:prstGeom prst="rect">
+            <a:avLst/>
+          </a:prstGeom>
+          <a:noFill/>
+        </p:spPr>
+        <p:txBody>
+          <a:bodyPr wrap="square" rtlCol="0">
+            <a:spAutoFit/>
+          </a:bodyPr>
+          <a:lstStyle/>
+          <a:p>
+            <a:r>
+              <a:rPr lang="en-CA" sz="2400" b="1" dirty="0"/>
+              <a:t>Technician change names/scores</a:t>
+            </a:r>
+          </a:p>
+        </p:txBody>
+      </p:sp>
+      <p:cxnSp>
+        <p:nvCxnSpPr>
+          <p:cNvPr id="14" name="Straight Connector 13">
+            <a:extLst>
+              <a:ext uri="{FF2B5EF4-FFF2-40B4-BE49-F238E27FC236}">
+                <a16:creationId xmlns:a16="http://schemas.microsoft.com/office/drawing/2014/main" id="{0B168BB9-2FFE-4390-A062-8727EF70FE7B}"/>
+              </a:ext>
+            </a:extLst>
+          </p:cNvPr>
+          <p:cNvCxnSpPr>
+            <a:cxnSpLocks/>
+          </p:cNvCxnSpPr>
+          <p:nvPr/>
+        </p:nvCxnSpPr>
+        <p:spPr>
+          <a:xfrm>
+            <a:off x="5895703" y="2821577"/>
+            <a:ext cx="2616701" cy="958571"/>
+          </a:xfrm>
+          <a:prstGeom prst="line">
+            <a:avLst/>
+          </a:prstGeom>
+          <a:ln w="28575">
+            <a:solidFill>
+              <a:srgbClr val="92D050"/>
+            </a:solidFill>
+            <a:headEnd type="none" w="lg" len="lg"/>
+            <a:tailEnd type="triangle" w="lg" len="lg"/>
+          </a:ln>
+        </p:spPr>
+        <p:style>
+          <a:lnRef idx="1">
+            <a:schemeClr val="accent1"/>
+          </a:lnRef>
+          <a:fillRef idx="0">
+            <a:schemeClr val="accent1"/>
+          </a:fillRef>
+          <a:effectRef idx="0">
+            <a:schemeClr val="accent1"/>
+          </a:effectRef>
+          <a:fontRef idx="minor">
+            <a:schemeClr val="tx1"/>
+          </a:fontRef>
+        </p:style>
+      </p:cxnSp>
+      <p:sp>
+        <p:nvSpPr>
+          <p:cNvPr id="15" name="TextBox 14">
+            <a:extLst>
+              <a:ext uri="{FF2B5EF4-FFF2-40B4-BE49-F238E27FC236}">
+                <a16:creationId xmlns:a16="http://schemas.microsoft.com/office/drawing/2014/main" id="{F227B532-2DB3-4F25-8AAF-6F03FD75AE9C}"/>
+              </a:ext>
+            </a:extLst>
+          </p:cNvPr>
+          <p:cNvSpPr txBox="1"/>
+          <p:nvPr/>
+        </p:nvSpPr>
+        <p:spPr>
+          <a:xfrm rot="1248694">
+            <a:off x="5984512" y="3318483"/>
+            <a:ext cx="2305708" cy="923330"/>
+          </a:xfrm>
+          <a:prstGeom prst="rect">
+            <a:avLst/>
+          </a:prstGeom>
+          <a:noFill/>
+        </p:spPr>
+        <p:txBody>
+          <a:bodyPr wrap="square" rtlCol="0">
+            <a:spAutoFit/>
+          </a:bodyPr>
+          <a:lstStyle/>
+          <a:p>
+            <a:r>
+              <a:rPr lang="en-CA" dirty="0" err="1"/>
+              <a:t>playerListChanged</a:t>
             </a:r>
             <a:endParaRPr lang="en-CA" dirty="0"/>
           </a:p>
           <a:p>
-            <a:pPr fontAlgn="t"/>
-            <a:r>
-              <a:rPr lang="en-CA" b="1" dirty="0"/>
-              <a:t>Request Method: </a:t>
-            </a:r>
-          </a:p>
-          <a:p>
-            <a:pPr marL="0" indent="0" latinLnBrk="1">
-              <a:buNone/>
-            </a:pPr>
             <a:r>
               <a:rPr lang="en-CA" dirty="0"/>
-              <a:t>	GET</a:t>
-            </a:r>
-          </a:p>
-          <a:p>
-            <a:pPr fontAlgn="t"/>
-            <a:r>
-              <a:rPr lang="en-CA" b="1" dirty="0"/>
-              <a:t>path: </a:t>
-            </a:r>
-          </a:p>
-          <a:p>
-            <a:pPr marL="457200" lvl="1" indent="0" latinLnBrk="1">
-              <a:buNone/>
-            </a:pPr>
-            <a:r>
-              <a:rPr lang="en-CA" dirty="0"/>
-              <a:t>/</a:t>
-            </a:r>
+              <a:t>OR</a:t>
+            </a:r>
+          </a:p>
+          <a:p>
             <a:r>
               <a:rPr lang="en-CA" dirty="0" err="1"/>
-              <a:t>gamesocket</a:t>
-            </a:r>
-            <a:r>
-              <a:rPr lang="en-CA" dirty="0"/>
-              <a:t>/?</a:t>
-            </a:r>
-            <a:r>
-              <a:rPr lang="en-CA" dirty="0" err="1"/>
-              <a:t>ip</a:t>
-            </a:r>
-            <a:r>
-              <a:rPr lang="en-CA" dirty="0"/>
-              <a:t>=</a:t>
-            </a:r>
-            <a:r>
-              <a:rPr lang="en-CA" dirty="0" err="1"/>
-              <a:t>24.212.142.167&amp;EIO</a:t>
-            </a:r>
-            <a:r>
-              <a:rPr lang="en-CA" dirty="0"/>
-              <a:t>=</a:t>
-            </a:r>
-            <a:r>
-              <a:rPr lang="en-CA" dirty="0" err="1"/>
-              <a:t>3&amp;transport</a:t>
-            </a:r>
-            <a:r>
-              <a:rPr lang="en-CA" dirty="0"/>
-              <a:t>=</a:t>
-            </a:r>
-            <a:r>
-              <a:rPr lang="en-CA" dirty="0" err="1"/>
-              <a:t>polling&amp;t</a:t>
-            </a:r>
-            <a:r>
-              <a:rPr lang="en-CA" dirty="0"/>
-              <a:t>=</a:t>
-            </a:r>
-            <a:r>
-              <a:rPr lang="en-CA" dirty="0" err="1"/>
-              <a:t>N7C6_EQ</a:t>
-            </a:r>
-            <a:endParaRPr lang="en-CA" dirty="0"/>
-          </a:p>
-          <a:p>
-            <a:pPr marL="457200" lvl="1" indent="0" latinLnBrk="1">
-              <a:buNone/>
-            </a:pPr>
-            <a:endParaRPr lang="en-CA" dirty="0"/>
-          </a:p>
-          <a:p>
-            <a:pPr latinLnBrk="1"/>
-            <a:r>
-              <a:rPr lang="en-CA" b="1" dirty="0"/>
-              <a:t>Query String Parameters</a:t>
-            </a:r>
-          </a:p>
-          <a:p>
-            <a:pPr marL="457200" lvl="1" indent="0" latinLnBrk="1">
-              <a:buNone/>
-            </a:pPr>
-            <a:r>
-              <a:rPr lang="en-CA" dirty="0" err="1"/>
-              <a:t>ip</a:t>
-            </a:r>
-            <a:r>
-              <a:rPr lang="en-CA" dirty="0"/>
-              <a:t>: 24.212.142.167</a:t>
-            </a:r>
-          </a:p>
-          <a:p>
-            <a:pPr marL="457200" lvl="1" indent="0" latinLnBrk="1">
-              <a:buNone/>
-            </a:pPr>
-            <a:endParaRPr lang="en-CA" dirty="0"/>
-          </a:p>
-          <a:p>
+              <a:t>playerScoresChanged</a:t>
+            </a:r>
             <a:endParaRPr lang="en-CA" dirty="0"/>
           </a:p>
         </p:txBody>
@@ -8809,7 +8476,7 @@
     </p:spTree>
     <p:extLst>
       <p:ext uri="{BB962C8B-B14F-4D97-AF65-F5344CB8AC3E}">
-        <p14:creationId xmlns:p14="http://schemas.microsoft.com/office/powerpoint/2010/main" val="545528636"/>
+        <p14:creationId xmlns:p14="http://schemas.microsoft.com/office/powerpoint/2010/main" val="2531946653"/>
       </p:ext>
     </p:extLst>
   </p:cSld>
@@ -9584,7 +9251,7 @@
           <p:cNvPr id="2" name="Title 1">
             <a:extLst>
               <a:ext uri="{FF2B5EF4-FFF2-40B4-BE49-F238E27FC236}">
-                <a16:creationId xmlns:a16="http://schemas.microsoft.com/office/drawing/2014/main" id="{22BE46A5-BE5C-40A2-B259-1E44E2202981}"/>
+                <a16:creationId xmlns:a16="http://schemas.microsoft.com/office/drawing/2014/main" id="{8D67DFE2-A656-4EB7-87FE-78EFCF09B8D4}"/>
               </a:ext>
             </a:extLst>
           </p:cNvPr>
@@ -9597,87 +9264,947 @@
         </p:nvSpPr>
         <p:spPr>
           <a:xfrm>
-            <a:off x="91751" y="85207"/>
-            <a:ext cx="5021424" cy="586597"/>
-          </a:xfrm>
-        </p:spPr>
-        <p:txBody>
-          <a:bodyPr>
-            <a:normAutofit fontScale="90000"/>
-          </a:bodyPr>
+            <a:off x="0" y="-68508"/>
+            <a:ext cx="10515600" cy="832079"/>
+          </a:xfrm>
+        </p:spPr>
+        <p:txBody>
+          <a:bodyPr/>
           <a:lstStyle/>
           <a:p>
             <a:r>
               <a:rPr lang="en-CA" dirty="0"/>
-              <a:t>New Error message:</a:t>
+              <a:t>Socket Connection</a:t>
             </a:r>
           </a:p>
         </p:txBody>
       </p:sp>
       <p:pic>
         <p:nvPicPr>
-          <p:cNvPr id="5" name="Picture 4">
-            <a:extLst>
-              <a:ext uri="{FF2B5EF4-FFF2-40B4-BE49-F238E27FC236}">
-                <a16:creationId xmlns:a16="http://schemas.microsoft.com/office/drawing/2014/main" id="{BEE605A6-0264-4B7A-90FE-DC90AD14840C}"/>
+          <p:cNvPr id="4" name="Picture 4" descr="Dedicated Server PNG Image | Server, Dedication, Png images">
+            <a:extLst>
+              <a:ext uri="{FF2B5EF4-FFF2-40B4-BE49-F238E27FC236}">
+                <a16:creationId xmlns:a16="http://schemas.microsoft.com/office/drawing/2014/main" id="{B8BBBA72-D009-4D28-BDFD-C4E6B0F3493C}"/>
               </a:ext>
             </a:extLst>
           </p:cNvPr>
           <p:cNvPicPr>
-            <a:picLocks noChangeAspect="1"/>
+            <a:picLocks noChangeAspect="1" noChangeArrowheads="1"/>
           </p:cNvPicPr>
           <p:nvPr/>
         </p:nvPicPr>
         <p:blipFill>
-          <a:blip r:embed="rId2"/>
+          <a:blip r:embed="rId2">
+            <a:extLst>
+              <a:ext uri="{28A0092B-C50C-407E-A947-70E740481C1C}">
+                <a14:useLocalDpi xmlns:a14="http://schemas.microsoft.com/office/drawing/2010/main" val="0"/>
+              </a:ext>
+            </a:extLst>
+          </a:blip>
+          <a:srcRect/>
           <a:stretch>
             <a:fillRect/>
           </a:stretch>
         </p:blipFill>
-        <p:spPr>
-          <a:xfrm>
-            <a:off x="167272" y="2448309"/>
-            <a:ext cx="6485455" cy="4199750"/>
-          </a:xfrm>
-          <a:prstGeom prst="rect">
-            <a:avLst/>
-          </a:prstGeom>
+        <p:spPr bwMode="auto">
+          <a:xfrm>
+            <a:off x="5359389" y="1019598"/>
+            <a:ext cx="770945" cy="1039475"/>
+          </a:xfrm>
+          <a:prstGeom prst="rect">
+            <a:avLst/>
+          </a:prstGeom>
+          <a:noFill/>
+          <a:extLst>
+            <a:ext uri="{909E8E84-426E-40DD-AFC4-6F175D3DCCD1}">
+              <a14:hiddenFill xmlns:a14="http://schemas.microsoft.com/office/drawing/2010/main">
+                <a:solidFill>
+                  <a:srgbClr val="FFFFFF"/>
+                </a:solidFill>
+              </a14:hiddenFill>
+            </a:ext>
+          </a:extLst>
         </p:spPr>
       </p:pic>
       <p:pic>
         <p:nvPicPr>
-          <p:cNvPr id="6" name="Picture 5">
-            <a:extLst>
-              <a:ext uri="{FF2B5EF4-FFF2-40B4-BE49-F238E27FC236}">
-                <a16:creationId xmlns:a16="http://schemas.microsoft.com/office/drawing/2014/main" id="{C0BFDC74-9E0A-4DF7-9217-4989DD5552BF}"/>
+          <p:cNvPr id="5" name="Picture 6" descr="Laptop Clip Art At Clker Com Vector - Laptop Black And White Clip ...">
+            <a:extLst>
+              <a:ext uri="{FF2B5EF4-FFF2-40B4-BE49-F238E27FC236}">
+                <a16:creationId xmlns:a16="http://schemas.microsoft.com/office/drawing/2014/main" id="{A54F7E2C-EF05-4D30-9675-D7EADDD40D5F}"/>
               </a:ext>
             </a:extLst>
           </p:cNvPr>
           <p:cNvPicPr>
-            <a:picLocks noChangeAspect="1"/>
+            <a:picLocks noChangeAspect="1" noChangeArrowheads="1"/>
           </p:cNvPicPr>
           <p:nvPr/>
         </p:nvPicPr>
         <p:blipFill>
-          <a:blip r:embed="rId3"/>
+          <a:blip r:embed="rId3">
+            <a:clrChange>
+              <a:clrFrom>
+                <a:srgbClr val="F6F6F6"/>
+              </a:clrFrom>
+              <a:clrTo>
+                <a:srgbClr val="F6F6F6">
+                  <a:alpha val="0"/>
+                </a:srgbClr>
+              </a:clrTo>
+            </a:clrChange>
+            <a:extLst>
+              <a:ext uri="{28A0092B-C50C-407E-A947-70E740481C1C}">
+                <a14:useLocalDpi xmlns:a14="http://schemas.microsoft.com/office/drawing/2010/main" val="0"/>
+              </a:ext>
+            </a:extLst>
+          </a:blip>
+          <a:srcRect/>
           <a:stretch>
             <a:fillRect/>
           </a:stretch>
         </p:blipFill>
-        <p:spPr>
-          <a:xfrm>
-            <a:off x="4432638" y="168598"/>
-            <a:ext cx="7174644" cy="2196320"/>
-          </a:xfrm>
-          <a:prstGeom prst="rect">
-            <a:avLst/>
-          </a:prstGeom>
+        <p:spPr bwMode="auto">
+          <a:xfrm>
+            <a:off x="8946107" y="4054361"/>
+            <a:ext cx="1849089" cy="1533392"/>
+          </a:xfrm>
+          <a:prstGeom prst="rect">
+            <a:avLst/>
+          </a:prstGeom>
+          <a:noFill/>
+          <a:extLst>
+            <a:ext uri="{909E8E84-426E-40DD-AFC4-6F175D3DCCD1}">
+              <a14:hiddenFill xmlns:a14="http://schemas.microsoft.com/office/drawing/2010/main">
+                <a:solidFill>
+                  <a:srgbClr val="FFFFFF"/>
+                </a:solidFill>
+              </a14:hiddenFill>
+            </a:ext>
+          </a:extLst>
+        </p:spPr>
+      </p:pic>
+      <p:pic>
+        <p:nvPicPr>
+          <p:cNvPr id="2050" name="Picture 2" descr="Free Free Laptop Cliparts, Download Free Clip Art, Free Clip Art ...">
+            <a:extLst>
+              <a:ext uri="{FF2B5EF4-FFF2-40B4-BE49-F238E27FC236}">
+                <a16:creationId xmlns:a16="http://schemas.microsoft.com/office/drawing/2014/main" id="{2F1D7E14-40B7-4333-9751-1D4C24BCECF9}"/>
+              </a:ext>
+            </a:extLst>
+          </p:cNvPr>
+          <p:cNvPicPr>
+            <a:picLocks noChangeAspect="1" noChangeArrowheads="1"/>
+          </p:cNvPicPr>
+          <p:nvPr/>
+        </p:nvPicPr>
+        <p:blipFill>
+          <a:blip r:embed="rId4">
+            <a:extLst>
+              <a:ext uri="{28A0092B-C50C-407E-A947-70E740481C1C}">
+                <a14:useLocalDpi xmlns:a14="http://schemas.microsoft.com/office/drawing/2010/main" val="0"/>
+              </a:ext>
+            </a:extLst>
+          </a:blip>
+          <a:srcRect/>
+          <a:stretch>
+            <a:fillRect/>
+          </a:stretch>
+        </p:blipFill>
+        <p:spPr bwMode="auto">
+          <a:xfrm>
+            <a:off x="1346757" y="1968079"/>
+            <a:ext cx="1975759" cy="1568063"/>
+          </a:xfrm>
+          <a:prstGeom prst="rect">
+            <a:avLst/>
+          </a:prstGeom>
+          <a:noFill/>
+          <a:extLst>
+            <a:ext uri="{909E8E84-426E-40DD-AFC4-6F175D3DCCD1}">
+              <a14:hiddenFill xmlns:a14="http://schemas.microsoft.com/office/drawing/2010/main">
+                <a:solidFill>
+                  <a:srgbClr val="FFFFFF"/>
+                </a:solidFill>
+              </a14:hiddenFill>
+            </a:ext>
+          </a:extLst>
+        </p:spPr>
+      </p:pic>
+      <p:pic>
+        <p:nvPicPr>
+          <p:cNvPr id="2052" name="Picture 4" descr="Facebook Brand Resources">
+            <a:extLst>
+              <a:ext uri="{FF2B5EF4-FFF2-40B4-BE49-F238E27FC236}">
+                <a16:creationId xmlns:a16="http://schemas.microsoft.com/office/drawing/2014/main" id="{7A69D878-E909-49BD-8643-2C4A6148D6CD}"/>
+              </a:ext>
+            </a:extLst>
+          </p:cNvPr>
+          <p:cNvPicPr>
+            <a:picLocks noChangeAspect="1" noChangeArrowheads="1"/>
+          </p:cNvPicPr>
+          <p:nvPr/>
+        </p:nvPicPr>
+        <p:blipFill>
+          <a:blip r:embed="rId5">
+            <a:extLst>
+              <a:ext uri="{28A0092B-C50C-407E-A947-70E740481C1C}">
+                <a14:useLocalDpi xmlns:a14="http://schemas.microsoft.com/office/drawing/2010/main" val="0"/>
+              </a:ext>
+            </a:extLst>
+          </a:blip>
+          <a:srcRect/>
+          <a:stretch>
+            <a:fillRect/>
+          </a:stretch>
+        </p:blipFill>
+        <p:spPr bwMode="auto">
+          <a:xfrm>
+            <a:off x="3266350" y="3519306"/>
+            <a:ext cx="646331" cy="646331"/>
+          </a:xfrm>
+          <a:prstGeom prst="rect">
+            <a:avLst/>
+          </a:prstGeom>
+          <a:noFill/>
+          <a:extLst>
+            <a:ext uri="{909E8E84-426E-40DD-AFC4-6F175D3DCCD1}">
+              <a14:hiddenFill xmlns:a14="http://schemas.microsoft.com/office/drawing/2010/main">
+                <a:solidFill>
+                  <a:srgbClr val="FFFFFF"/>
+                </a:solidFill>
+              </a14:hiddenFill>
+            </a:ext>
+          </a:extLst>
+        </p:spPr>
+      </p:pic>
+      <p:sp>
+        <p:nvSpPr>
+          <p:cNvPr id="6" name="Arc 5">
+            <a:extLst>
+              <a:ext uri="{FF2B5EF4-FFF2-40B4-BE49-F238E27FC236}">
+                <a16:creationId xmlns:a16="http://schemas.microsoft.com/office/drawing/2014/main" id="{F3F126BB-CFC8-4AAB-BA91-EF2A1E81FAAC}"/>
+              </a:ext>
+            </a:extLst>
+          </p:cNvPr>
+          <p:cNvSpPr/>
+          <p:nvPr/>
+        </p:nvSpPr>
+        <p:spPr>
+          <a:xfrm flipV="1">
+            <a:off x="3064785" y="1803628"/>
+            <a:ext cx="9988784" cy="3671174"/>
+          </a:xfrm>
+          <a:prstGeom prst="arc">
+            <a:avLst>
+              <a:gd name="adj1" fmla="val 10764713"/>
+              <a:gd name="adj2" fmla="val 18709222"/>
+            </a:avLst>
+          </a:prstGeom>
+          <a:ln w="38100">
+            <a:headEnd type="none" w="med" len="med"/>
+            <a:tailEnd type="triangle" w="lg" len="lg"/>
+          </a:ln>
+        </p:spPr>
+        <p:style>
+          <a:lnRef idx="1">
+            <a:schemeClr val="accent1"/>
+          </a:lnRef>
+          <a:fillRef idx="0">
+            <a:schemeClr val="accent1"/>
+          </a:fillRef>
+          <a:effectRef idx="0">
+            <a:schemeClr val="accent1"/>
+          </a:effectRef>
+          <a:fontRef idx="minor">
+            <a:schemeClr val="tx1"/>
+          </a:fontRef>
+        </p:style>
+        <p:txBody>
+          <a:bodyPr rtlCol="0" anchor="ctr"/>
+          <a:lstStyle/>
+          <a:p>
+            <a:pPr algn="ctr"/>
+            <a:endParaRPr lang="en-CA" dirty="0"/>
+          </a:p>
+        </p:txBody>
+      </p:sp>
+      <p:sp>
+        <p:nvSpPr>
+          <p:cNvPr id="7" name="TextBox 6">
+            <a:extLst>
+              <a:ext uri="{FF2B5EF4-FFF2-40B4-BE49-F238E27FC236}">
+                <a16:creationId xmlns:a16="http://schemas.microsoft.com/office/drawing/2014/main" id="{BAC1A465-975D-4218-8A09-B4FE7FE49144}"/>
+              </a:ext>
+            </a:extLst>
+          </p:cNvPr>
+          <p:cNvSpPr txBox="1"/>
+          <p:nvPr/>
+        </p:nvSpPr>
+        <p:spPr>
+          <a:xfrm rot="708815">
+            <a:off x="2572196" y="4849105"/>
+            <a:ext cx="5478845" cy="646331"/>
+          </a:xfrm>
+          <a:prstGeom prst="rect">
+            <a:avLst/>
+          </a:prstGeom>
+          <a:noFill/>
+        </p:spPr>
+        <p:txBody>
+          <a:bodyPr wrap="square" rtlCol="0">
+            <a:spAutoFit/>
+          </a:bodyPr>
+          <a:lstStyle/>
+          <a:p>
+            <a:r>
+              <a:rPr lang="en-CA" dirty="0"/>
+              <a:t>I give them www.gameshow.geoffspielman.com?ip=24.212.142.167</a:t>
+            </a:r>
+          </a:p>
+        </p:txBody>
+      </p:sp>
+      <p:cxnSp>
+        <p:nvCxnSpPr>
+          <p:cNvPr id="9" name="Straight Arrow Connector 8">
+            <a:extLst>
+              <a:ext uri="{FF2B5EF4-FFF2-40B4-BE49-F238E27FC236}">
+                <a16:creationId xmlns:a16="http://schemas.microsoft.com/office/drawing/2014/main" id="{20ACEA87-24DC-4E77-ABFD-90BCA1E3EE2F}"/>
+              </a:ext>
+            </a:extLst>
+          </p:cNvPr>
+          <p:cNvCxnSpPr>
+            <a:cxnSpLocks/>
+          </p:cNvCxnSpPr>
+          <p:nvPr/>
+        </p:nvCxnSpPr>
+        <p:spPr>
+          <a:xfrm flipH="1" flipV="1">
+            <a:off x="8634953" y="3983709"/>
+            <a:ext cx="979901" cy="450469"/>
+          </a:xfrm>
+          <a:prstGeom prst="straightConnector1">
+            <a:avLst/>
+          </a:prstGeom>
+          <a:ln w="28575">
+            <a:tailEnd type="triangle"/>
+          </a:ln>
+        </p:spPr>
+        <p:style>
+          <a:lnRef idx="1">
+            <a:schemeClr val="accent1"/>
+          </a:lnRef>
+          <a:fillRef idx="0">
+            <a:schemeClr val="accent1"/>
+          </a:fillRef>
+          <a:effectRef idx="0">
+            <a:schemeClr val="accent1"/>
+          </a:effectRef>
+          <a:fontRef idx="minor">
+            <a:schemeClr val="tx1"/>
+          </a:fontRef>
+        </p:style>
+      </p:cxnSp>
+      <p:sp>
+        <p:nvSpPr>
+          <p:cNvPr id="12" name="TextBox 11">
+            <a:extLst>
+              <a:ext uri="{FF2B5EF4-FFF2-40B4-BE49-F238E27FC236}">
+                <a16:creationId xmlns:a16="http://schemas.microsoft.com/office/drawing/2014/main" id="{49F76250-7EFD-4046-8AD9-C67D014EB8D7}"/>
+              </a:ext>
+            </a:extLst>
+          </p:cNvPr>
+          <p:cNvSpPr txBox="1"/>
+          <p:nvPr/>
+        </p:nvSpPr>
+        <p:spPr>
+          <a:xfrm>
+            <a:off x="6212860" y="991651"/>
+            <a:ext cx="2311139" cy="923330"/>
+          </a:xfrm>
+          <a:prstGeom prst="rect">
+            <a:avLst/>
+          </a:prstGeom>
+          <a:noFill/>
+        </p:spPr>
+        <p:txBody>
+          <a:bodyPr wrap="square" rtlCol="0">
+            <a:spAutoFit/>
+          </a:bodyPr>
+          <a:lstStyle/>
+          <a:p>
+            <a:r>
+              <a:rPr lang="en-CA" dirty="0"/>
+              <a:t>Client gets public content (index, images </a:t>
+            </a:r>
+            <a:r>
+              <a:rPr lang="en-CA" dirty="0" err="1"/>
+              <a:t>etc</a:t>
+            </a:r>
+            <a:r>
+              <a:rPr lang="en-CA" dirty="0"/>
+              <a:t>) from digital ocean </a:t>
+            </a:r>
+          </a:p>
+        </p:txBody>
+      </p:sp>
+      <p:pic>
+        <p:nvPicPr>
+          <p:cNvPr id="11" name="Picture 10">
+            <a:extLst>
+              <a:ext uri="{FF2B5EF4-FFF2-40B4-BE49-F238E27FC236}">
+                <a16:creationId xmlns:a16="http://schemas.microsoft.com/office/drawing/2014/main" id="{B1632617-9153-482F-99B7-8E54F2289BEE}"/>
+              </a:ext>
+            </a:extLst>
+          </p:cNvPr>
+          <p:cNvPicPr>
+            <a:picLocks noChangeAspect="1"/>
+          </p:cNvPicPr>
+          <p:nvPr/>
+        </p:nvPicPr>
+        <p:blipFill>
+          <a:blip r:embed="rId6">
+            <a:clrChange>
+              <a:clrFrom>
+                <a:srgbClr val="000000"/>
+              </a:clrFrom>
+              <a:clrTo>
+                <a:srgbClr val="000000">
+                  <a:alpha val="0"/>
+                </a:srgbClr>
+              </a:clrTo>
+            </a:clrChange>
+          </a:blip>
+          <a:stretch>
+            <a:fillRect/>
+          </a:stretch>
+        </p:blipFill>
+        <p:spPr>
+          <a:xfrm>
+            <a:off x="7963916" y="3488385"/>
+            <a:ext cx="580616" cy="890047"/>
+          </a:xfrm>
+          <a:prstGeom prst="rect">
+            <a:avLst/>
+          </a:prstGeom>
+        </p:spPr>
+      </p:pic>
+      <p:sp>
+        <p:nvSpPr>
+          <p:cNvPr id="17" name="TextBox 16">
+            <a:extLst>
+              <a:ext uri="{FF2B5EF4-FFF2-40B4-BE49-F238E27FC236}">
+                <a16:creationId xmlns:a16="http://schemas.microsoft.com/office/drawing/2014/main" id="{D829789C-D2FA-4964-B3B8-5139751AB539}"/>
+              </a:ext>
+            </a:extLst>
+          </p:cNvPr>
+          <p:cNvSpPr txBox="1"/>
+          <p:nvPr/>
+        </p:nvSpPr>
+        <p:spPr>
+          <a:xfrm>
+            <a:off x="7632581" y="3169712"/>
+            <a:ext cx="1243286" cy="369332"/>
+          </a:xfrm>
+          <a:prstGeom prst="rect">
+            <a:avLst/>
+          </a:prstGeom>
+          <a:noFill/>
+        </p:spPr>
+        <p:txBody>
+          <a:bodyPr wrap="square" rtlCol="0">
+            <a:spAutoFit/>
+          </a:bodyPr>
+          <a:lstStyle/>
+          <a:p>
+            <a:r>
+              <a:rPr lang="en-CA"/>
+              <a:t>DNS Server</a:t>
+            </a:r>
+            <a:endParaRPr lang="en-CA" dirty="0"/>
+          </a:p>
+        </p:txBody>
+      </p:sp>
+      <p:pic>
+        <p:nvPicPr>
+          <p:cNvPr id="18" name="Picture 17">
+            <a:extLst>
+              <a:ext uri="{FF2B5EF4-FFF2-40B4-BE49-F238E27FC236}">
+                <a16:creationId xmlns:a16="http://schemas.microsoft.com/office/drawing/2014/main" id="{481234E0-FD00-4AB6-A6E4-62D149C7D8DB}"/>
+              </a:ext>
+            </a:extLst>
+          </p:cNvPr>
+          <p:cNvPicPr>
+            <a:picLocks noChangeAspect="1"/>
+          </p:cNvPicPr>
+          <p:nvPr/>
+        </p:nvPicPr>
+        <p:blipFill>
+          <a:blip r:embed="rId7">
+            <a:clrChange>
+              <a:clrFrom>
+                <a:srgbClr val="000000"/>
+              </a:clrFrom>
+              <a:clrTo>
+                <a:srgbClr val="000000">
+                  <a:alpha val="0"/>
+                </a:srgbClr>
+              </a:clrTo>
+            </a:clrChange>
+          </a:blip>
+          <a:stretch>
+            <a:fillRect/>
+          </a:stretch>
+        </p:blipFill>
+        <p:spPr>
+          <a:xfrm>
+            <a:off x="4668719" y="3039411"/>
+            <a:ext cx="1818293" cy="542991"/>
+          </a:xfrm>
+          <a:prstGeom prst="rect">
+            <a:avLst/>
+          </a:prstGeom>
+        </p:spPr>
+      </p:pic>
+      <p:cxnSp>
+        <p:nvCxnSpPr>
+          <p:cNvPr id="21" name="Straight Arrow Connector 20">
+            <a:extLst>
+              <a:ext uri="{FF2B5EF4-FFF2-40B4-BE49-F238E27FC236}">
+                <a16:creationId xmlns:a16="http://schemas.microsoft.com/office/drawing/2014/main" id="{DB9448DA-77CA-4332-8CBF-7209CBBFC28A}"/>
+              </a:ext>
+            </a:extLst>
+          </p:cNvPr>
+          <p:cNvCxnSpPr>
+            <a:cxnSpLocks/>
+            <a:endCxn id="18" idx="3"/>
+          </p:cNvCxnSpPr>
+          <p:nvPr/>
+        </p:nvCxnSpPr>
+        <p:spPr>
+          <a:xfrm flipH="1" flipV="1">
+            <a:off x="6487012" y="3310907"/>
+            <a:ext cx="1311238" cy="450470"/>
+          </a:xfrm>
+          <a:prstGeom prst="straightConnector1">
+            <a:avLst/>
+          </a:prstGeom>
+          <a:ln w="28575">
+            <a:tailEnd type="triangle"/>
+          </a:ln>
+        </p:spPr>
+        <p:style>
+          <a:lnRef idx="1">
+            <a:schemeClr val="accent1"/>
+          </a:lnRef>
+          <a:fillRef idx="0">
+            <a:schemeClr val="accent1"/>
+          </a:fillRef>
+          <a:effectRef idx="0">
+            <a:schemeClr val="accent1"/>
+          </a:effectRef>
+          <a:fontRef idx="minor">
+            <a:schemeClr val="tx1"/>
+          </a:fontRef>
+        </p:style>
+      </p:cxnSp>
+      <p:pic>
+        <p:nvPicPr>
+          <p:cNvPr id="2058" name="Picture 10" descr="DigitalOcean - Wikipedia">
+            <a:extLst>
+              <a:ext uri="{FF2B5EF4-FFF2-40B4-BE49-F238E27FC236}">
+                <a16:creationId xmlns:a16="http://schemas.microsoft.com/office/drawing/2014/main" id="{E0D2E34C-73D0-4949-AA2C-746BE6140F69}"/>
+              </a:ext>
+            </a:extLst>
+          </p:cNvPr>
+          <p:cNvPicPr>
+            <a:picLocks noChangeAspect="1" noChangeArrowheads="1"/>
+          </p:cNvPicPr>
+          <p:nvPr/>
+        </p:nvPicPr>
+        <p:blipFill>
+          <a:blip r:embed="rId8">
+            <a:extLst>
+              <a:ext uri="{28A0092B-C50C-407E-A947-70E740481C1C}">
+                <a14:useLocalDpi xmlns:a14="http://schemas.microsoft.com/office/drawing/2010/main" val="0"/>
+              </a:ext>
+            </a:extLst>
+          </a:blip>
+          <a:srcRect/>
+          <a:stretch>
+            <a:fillRect/>
+          </a:stretch>
+        </p:blipFill>
+        <p:spPr bwMode="auto">
+          <a:xfrm>
+            <a:off x="4334916" y="1001158"/>
+            <a:ext cx="922884" cy="922884"/>
+          </a:xfrm>
+          <a:prstGeom prst="rect">
+            <a:avLst/>
+          </a:prstGeom>
+          <a:noFill/>
+          <a:extLst>
+            <a:ext uri="{909E8E84-426E-40DD-AFC4-6F175D3DCCD1}">
+              <a14:hiddenFill xmlns:a14="http://schemas.microsoft.com/office/drawing/2010/main">
+                <a:solidFill>
+                  <a:srgbClr val="FFFFFF"/>
+                </a:solidFill>
+              </a14:hiddenFill>
+            </a:ext>
+          </a:extLst>
+        </p:spPr>
+      </p:pic>
+      <p:cxnSp>
+        <p:nvCxnSpPr>
+          <p:cNvPr id="24" name="Straight Arrow Connector 23">
+            <a:extLst>
+              <a:ext uri="{FF2B5EF4-FFF2-40B4-BE49-F238E27FC236}">
+                <a16:creationId xmlns:a16="http://schemas.microsoft.com/office/drawing/2014/main" id="{44136FD6-B266-4EC7-8849-B5344E7A6DC6}"/>
+              </a:ext>
+            </a:extLst>
+          </p:cNvPr>
+          <p:cNvCxnSpPr>
+            <a:cxnSpLocks/>
+          </p:cNvCxnSpPr>
+          <p:nvPr/>
+        </p:nvCxnSpPr>
+        <p:spPr>
+          <a:xfrm flipH="1" flipV="1">
+            <a:off x="5359389" y="2148405"/>
+            <a:ext cx="385472" cy="826725"/>
+          </a:xfrm>
+          <a:prstGeom prst="straightConnector1">
+            <a:avLst/>
+          </a:prstGeom>
+          <a:ln w="28575">
+            <a:tailEnd type="triangle"/>
+          </a:ln>
+        </p:spPr>
+        <p:style>
+          <a:lnRef idx="1">
+            <a:schemeClr val="accent1"/>
+          </a:lnRef>
+          <a:fillRef idx="0">
+            <a:schemeClr val="accent1"/>
+          </a:fillRef>
+          <a:effectRef idx="0">
+            <a:schemeClr val="accent1"/>
+          </a:effectRef>
+          <a:fontRef idx="minor">
+            <a:schemeClr val="tx1"/>
+          </a:fontRef>
+        </p:style>
+      </p:cxnSp>
+      <p:sp>
+        <p:nvSpPr>
+          <p:cNvPr id="28" name="Arc 27">
+            <a:extLst>
+              <a:ext uri="{FF2B5EF4-FFF2-40B4-BE49-F238E27FC236}">
+                <a16:creationId xmlns:a16="http://schemas.microsoft.com/office/drawing/2014/main" id="{C7257964-613E-4432-A46F-B23F51E26DF4}"/>
+              </a:ext>
+            </a:extLst>
+          </p:cNvPr>
+          <p:cNvSpPr/>
+          <p:nvPr/>
+        </p:nvSpPr>
+        <p:spPr>
+          <a:xfrm rot="13889773" flipH="1" flipV="1">
+            <a:off x="5243741" y="1326305"/>
+            <a:ext cx="5193195" cy="3739505"/>
+          </a:xfrm>
+          <a:prstGeom prst="arc">
+            <a:avLst>
+              <a:gd name="adj1" fmla="val 11463417"/>
+              <a:gd name="adj2" fmla="val 19922351"/>
+            </a:avLst>
+          </a:prstGeom>
+          <a:ln w="38100">
+            <a:headEnd type="none" w="med" len="med"/>
+            <a:tailEnd type="triangle" w="lg" len="lg"/>
+          </a:ln>
+        </p:spPr>
+        <p:style>
+          <a:lnRef idx="1">
+            <a:schemeClr val="accent1"/>
+          </a:lnRef>
+          <a:fillRef idx="0">
+            <a:schemeClr val="accent1"/>
+          </a:fillRef>
+          <a:effectRef idx="0">
+            <a:schemeClr val="accent1"/>
+          </a:effectRef>
+          <a:fontRef idx="minor">
+            <a:schemeClr val="tx1"/>
+          </a:fontRef>
+        </p:style>
+        <p:txBody>
+          <a:bodyPr rtlCol="0" anchor="ctr"/>
+          <a:lstStyle/>
+          <a:p>
+            <a:pPr algn="ctr"/>
+            <a:endParaRPr lang="en-CA"/>
+          </a:p>
+        </p:txBody>
+      </p:sp>
+      <p:sp>
+        <p:nvSpPr>
+          <p:cNvPr id="29" name="TextBox 28">
+            <a:extLst>
+              <a:ext uri="{FF2B5EF4-FFF2-40B4-BE49-F238E27FC236}">
+                <a16:creationId xmlns:a16="http://schemas.microsoft.com/office/drawing/2014/main" id="{0E3641A7-21FF-4407-ACC9-920FB9C11AFA}"/>
+              </a:ext>
+            </a:extLst>
+          </p:cNvPr>
+          <p:cNvSpPr txBox="1"/>
+          <p:nvPr/>
+        </p:nvSpPr>
+        <p:spPr>
+          <a:xfrm>
+            <a:off x="4674877" y="3539535"/>
+            <a:ext cx="2311139" cy="646331"/>
+          </a:xfrm>
+          <a:prstGeom prst="rect">
+            <a:avLst/>
+          </a:prstGeom>
+          <a:noFill/>
+        </p:spPr>
+        <p:txBody>
+          <a:bodyPr wrap="square" rtlCol="0">
+            <a:spAutoFit/>
+          </a:bodyPr>
+          <a:lstStyle/>
+          <a:p>
+            <a:r>
+              <a:rPr lang="en-CA" dirty="0"/>
+              <a:t>Worker: no SSL on *gameshow</a:t>
+            </a:r>
+          </a:p>
+        </p:txBody>
+      </p:sp>
+      <p:pic>
+        <p:nvPicPr>
+          <p:cNvPr id="25" name="Picture 24">
+            <a:extLst>
+              <a:ext uri="{FF2B5EF4-FFF2-40B4-BE49-F238E27FC236}">
+                <a16:creationId xmlns:a16="http://schemas.microsoft.com/office/drawing/2014/main" id="{8F645A89-6FC5-40B9-8E1D-04D66B7ACAAA}"/>
+              </a:ext>
+            </a:extLst>
+          </p:cNvPr>
+          <p:cNvPicPr>
+            <a:picLocks noChangeAspect="1"/>
+          </p:cNvPicPr>
+          <p:nvPr/>
+        </p:nvPicPr>
+        <p:blipFill>
+          <a:blip r:embed="rId9">
+            <a:clrChange>
+              <a:clrFrom>
+                <a:srgbClr val="000000"/>
+              </a:clrFrom>
+              <a:clrTo>
+                <a:srgbClr val="000000">
+                  <a:alpha val="0"/>
+                </a:srgbClr>
+              </a:clrTo>
+            </a:clrChange>
+          </a:blip>
+          <a:stretch>
+            <a:fillRect/>
+          </a:stretch>
+        </p:blipFill>
+        <p:spPr>
+          <a:xfrm>
+            <a:off x="10405987" y="3920693"/>
+            <a:ext cx="903323" cy="1026970"/>
+          </a:xfrm>
+          <a:prstGeom prst="rect">
+            <a:avLst/>
+          </a:prstGeom>
+        </p:spPr>
+      </p:pic>
+      <p:sp>
+        <p:nvSpPr>
+          <p:cNvPr id="32" name="TextBox 31">
+            <a:extLst>
+              <a:ext uri="{FF2B5EF4-FFF2-40B4-BE49-F238E27FC236}">
+                <a16:creationId xmlns:a16="http://schemas.microsoft.com/office/drawing/2014/main" id="{DB0590A1-23F4-42DE-B060-F05E0295FDD7}"/>
+              </a:ext>
+            </a:extLst>
+          </p:cNvPr>
+          <p:cNvSpPr txBox="1"/>
+          <p:nvPr/>
+        </p:nvSpPr>
+        <p:spPr>
+          <a:xfrm>
+            <a:off x="10654472" y="4907270"/>
+            <a:ext cx="1468685" cy="646331"/>
+          </a:xfrm>
+          <a:prstGeom prst="rect">
+            <a:avLst/>
+          </a:prstGeom>
+          <a:noFill/>
+        </p:spPr>
+        <p:txBody>
+          <a:bodyPr wrap="square" rtlCol="0">
+            <a:spAutoFit/>
+          </a:bodyPr>
+          <a:lstStyle/>
+          <a:p>
+            <a:r>
+              <a:rPr lang="en-CA" dirty="0"/>
+              <a:t>Parse </a:t>
+            </a:r>
+            <a:r>
+              <a:rPr lang="en-CA" dirty="0" err="1"/>
+              <a:t>url</a:t>
+            </a:r>
+            <a:r>
+              <a:rPr lang="en-CA" dirty="0"/>
+              <a:t> for my IP address</a:t>
+            </a:r>
+          </a:p>
+        </p:txBody>
+      </p:sp>
+      <p:sp>
+        <p:nvSpPr>
+          <p:cNvPr id="33" name="Arc 32">
+            <a:extLst>
+              <a:ext uri="{FF2B5EF4-FFF2-40B4-BE49-F238E27FC236}">
+                <a16:creationId xmlns:a16="http://schemas.microsoft.com/office/drawing/2014/main" id="{3EEEFB70-3E1C-4FC6-8BF9-BA6CB948DB2B}"/>
+              </a:ext>
+            </a:extLst>
+          </p:cNvPr>
+          <p:cNvSpPr/>
+          <p:nvPr/>
+        </p:nvSpPr>
+        <p:spPr>
+          <a:xfrm flipH="1" flipV="1">
+            <a:off x="1396804" y="1270247"/>
+            <a:ext cx="9988784" cy="5377895"/>
+          </a:xfrm>
+          <a:prstGeom prst="arc">
+            <a:avLst>
+              <a:gd name="adj1" fmla="val 11931196"/>
+              <a:gd name="adj2" fmla="val 213157"/>
+            </a:avLst>
+          </a:prstGeom>
+          <a:ln w="38100">
+            <a:solidFill>
+              <a:srgbClr val="FF0000"/>
+            </a:solidFill>
+            <a:headEnd type="triangle" w="med" len="med"/>
+            <a:tailEnd type="triangle" w="med" len="med"/>
+          </a:ln>
+        </p:spPr>
+        <p:style>
+          <a:lnRef idx="1">
+            <a:schemeClr val="accent1"/>
+          </a:lnRef>
+          <a:fillRef idx="0">
+            <a:schemeClr val="accent1"/>
+          </a:fillRef>
+          <a:effectRef idx="0">
+            <a:schemeClr val="accent1"/>
+          </a:effectRef>
+          <a:fontRef idx="minor">
+            <a:schemeClr val="tx1"/>
+          </a:fontRef>
+        </p:style>
+        <p:txBody>
+          <a:bodyPr rtlCol="0" anchor="ctr"/>
+          <a:lstStyle/>
+          <a:p>
+            <a:pPr algn="ctr"/>
+            <a:endParaRPr lang="en-CA" dirty="0"/>
+          </a:p>
+        </p:txBody>
+      </p:sp>
+      <p:sp>
+        <p:nvSpPr>
+          <p:cNvPr id="34" name="TextBox 33">
+            <a:extLst>
+              <a:ext uri="{FF2B5EF4-FFF2-40B4-BE49-F238E27FC236}">
+                <a16:creationId xmlns:a16="http://schemas.microsoft.com/office/drawing/2014/main" id="{F59675D6-D1BD-47DB-8662-F2B23CA93E81}"/>
+              </a:ext>
+            </a:extLst>
+          </p:cNvPr>
+          <p:cNvSpPr txBox="1"/>
+          <p:nvPr/>
+        </p:nvSpPr>
+        <p:spPr>
+          <a:xfrm rot="708815">
+            <a:off x="2601010" y="5969142"/>
+            <a:ext cx="5478845" cy="369332"/>
+          </a:xfrm>
+          <a:prstGeom prst="rect">
+            <a:avLst/>
+          </a:prstGeom>
+          <a:noFill/>
+        </p:spPr>
+        <p:txBody>
+          <a:bodyPr wrap="square" rtlCol="0">
+            <a:spAutoFit/>
+          </a:bodyPr>
+          <a:lstStyle/>
+          <a:p>
+            <a:r>
+              <a:rPr lang="en-CA" dirty="0"/>
+              <a:t>Socket connection @ 24.212.142.167:3000</a:t>
+            </a:r>
+          </a:p>
+        </p:txBody>
+      </p:sp>
+      <p:pic>
+        <p:nvPicPr>
+          <p:cNvPr id="2062" name="Picture 14">
+            <a:extLst>
+              <a:ext uri="{FF2B5EF4-FFF2-40B4-BE49-F238E27FC236}">
+                <a16:creationId xmlns:a16="http://schemas.microsoft.com/office/drawing/2014/main" id="{3436B604-3FFF-47C9-BBAF-AF7A9175D956}"/>
+              </a:ext>
+            </a:extLst>
+          </p:cNvPr>
+          <p:cNvPicPr>
+            <a:picLocks noChangeAspect="1" noChangeArrowheads="1"/>
+          </p:cNvPicPr>
+          <p:nvPr/>
+        </p:nvPicPr>
+        <p:blipFill>
+          <a:blip r:embed="rId10">
+            <a:extLst>
+              <a:ext uri="{28A0092B-C50C-407E-A947-70E740481C1C}">
+                <a14:useLocalDpi xmlns:a14="http://schemas.microsoft.com/office/drawing/2010/main" val="0"/>
+              </a:ext>
+            </a:extLst>
+          </a:blip>
+          <a:srcRect/>
+          <a:stretch>
+            <a:fillRect/>
+          </a:stretch>
+        </p:blipFill>
+        <p:spPr bwMode="auto">
+          <a:xfrm>
+            <a:off x="122485" y="2944310"/>
+            <a:ext cx="1202435" cy="733192"/>
+          </a:xfrm>
+          <a:prstGeom prst="rect">
+            <a:avLst/>
+          </a:prstGeom>
+          <a:noFill/>
+          <a:extLst>
+            <a:ext uri="{909E8E84-426E-40DD-AFC4-6F175D3DCCD1}">
+              <a14:hiddenFill xmlns:a14="http://schemas.microsoft.com/office/drawing/2010/main">
+                <a:solidFill>
+                  <a:srgbClr val="FFFFFF"/>
+                </a:solidFill>
+              </a14:hiddenFill>
+            </a:ext>
+          </a:extLst>
         </p:spPr>
       </p:pic>
     </p:spTree>
     <p:extLst>
       <p:ext uri="{BB962C8B-B14F-4D97-AF65-F5344CB8AC3E}">
-        <p14:creationId xmlns:p14="http://schemas.microsoft.com/office/powerpoint/2010/main" val="3931187049"/>
+        <p14:creationId xmlns:p14="http://schemas.microsoft.com/office/powerpoint/2010/main" val="1160604219"/>
       </p:ext>
     </p:extLst>
   </p:cSld>
@@ -9709,6 +10236,354 @@
           <p:cNvPr id="2" name="Title 1">
             <a:extLst>
               <a:ext uri="{FF2B5EF4-FFF2-40B4-BE49-F238E27FC236}">
+                <a16:creationId xmlns:a16="http://schemas.microsoft.com/office/drawing/2014/main" id="{F834305A-B403-4127-8A5F-0ACDF6A6BB40}"/>
+              </a:ext>
+            </a:extLst>
+          </p:cNvPr>
+          <p:cNvSpPr>
+            <a:spLocks noGrp="1"/>
+          </p:cNvSpPr>
+          <p:nvPr>
+            <p:ph type="title"/>
+          </p:nvPr>
+        </p:nvSpPr>
+        <p:spPr>
+          <a:xfrm>
+            <a:off x="150223" y="0"/>
+            <a:ext cx="7896497" cy="740864"/>
+          </a:xfrm>
+        </p:spPr>
+        <p:txBody>
+          <a:bodyPr/>
+          <a:lstStyle/>
+          <a:p>
+            <a:r>
+              <a:rPr lang="en-CA" dirty="0"/>
+              <a:t>Worker Threw an Exception</a:t>
+            </a:r>
+          </a:p>
+        </p:txBody>
+      </p:sp>
+      <p:sp>
+        <p:nvSpPr>
+          <p:cNvPr id="3" name="Content Placeholder 2">
+            <a:extLst>
+              <a:ext uri="{FF2B5EF4-FFF2-40B4-BE49-F238E27FC236}">
+                <a16:creationId xmlns:a16="http://schemas.microsoft.com/office/drawing/2014/main" id="{0AAB999F-6D84-41DC-8140-C86A79AA1013}"/>
+              </a:ext>
+            </a:extLst>
+          </p:cNvPr>
+          <p:cNvSpPr>
+            <a:spLocks noGrp="1"/>
+          </p:cNvSpPr>
+          <p:nvPr>
+            <p:ph idx="1"/>
+          </p:nvPr>
+        </p:nvSpPr>
+        <p:spPr>
+          <a:xfrm>
+            <a:off x="315686" y="815431"/>
+            <a:ext cx="10515600" cy="4351338"/>
+          </a:xfrm>
+        </p:spPr>
+        <p:txBody>
+          <a:bodyPr>
+            <a:normAutofit lnSpcReduction="10000"/>
+          </a:bodyPr>
+          <a:lstStyle/>
+          <a:p>
+            <a:pPr fontAlgn="t"/>
+            <a:r>
+              <a:rPr lang="en-CA" b="1" dirty="0"/>
+              <a:t>Request URL: </a:t>
+            </a:r>
+          </a:p>
+          <a:p>
+            <a:pPr marL="457200" lvl="1" indent="0" latinLnBrk="1">
+              <a:buNone/>
+            </a:pPr>
+            <a:r>
+              <a:rPr lang="en-CA" dirty="0">
+                <a:hlinkClick r:id="rId2"/>
+              </a:rPr>
+              <a:t>https://gameshow.geoffspielman.com/gamesocket/?ip=24.212.142.167&amp;EIO=3&amp;transport=polling&amp;t=N7C6_EQ</a:t>
+            </a:r>
+            <a:endParaRPr lang="en-CA" dirty="0"/>
+          </a:p>
+          <a:p>
+            <a:pPr fontAlgn="t"/>
+            <a:r>
+              <a:rPr lang="en-CA" b="1" dirty="0"/>
+              <a:t>Request Method: </a:t>
+            </a:r>
+          </a:p>
+          <a:p>
+            <a:pPr marL="0" indent="0" latinLnBrk="1">
+              <a:buNone/>
+            </a:pPr>
+            <a:r>
+              <a:rPr lang="en-CA" dirty="0"/>
+              <a:t>	GET</a:t>
+            </a:r>
+          </a:p>
+          <a:p>
+            <a:pPr fontAlgn="t"/>
+            <a:r>
+              <a:rPr lang="en-CA" b="1" dirty="0"/>
+              <a:t>path: </a:t>
+            </a:r>
+          </a:p>
+          <a:p>
+            <a:pPr marL="457200" lvl="1" indent="0" latinLnBrk="1">
+              <a:buNone/>
+            </a:pPr>
+            <a:r>
+              <a:rPr lang="en-CA" dirty="0"/>
+              <a:t>/</a:t>
+            </a:r>
+            <a:r>
+              <a:rPr lang="en-CA" dirty="0" err="1"/>
+              <a:t>gamesocket</a:t>
+            </a:r>
+            <a:r>
+              <a:rPr lang="en-CA" dirty="0"/>
+              <a:t>/?</a:t>
+            </a:r>
+            <a:r>
+              <a:rPr lang="en-CA" dirty="0" err="1"/>
+              <a:t>ip</a:t>
+            </a:r>
+            <a:r>
+              <a:rPr lang="en-CA" dirty="0"/>
+              <a:t>=</a:t>
+            </a:r>
+            <a:r>
+              <a:rPr lang="en-CA" dirty="0" err="1"/>
+              <a:t>24.212.142.167&amp;EIO</a:t>
+            </a:r>
+            <a:r>
+              <a:rPr lang="en-CA" dirty="0"/>
+              <a:t>=</a:t>
+            </a:r>
+            <a:r>
+              <a:rPr lang="en-CA" dirty="0" err="1"/>
+              <a:t>3&amp;transport</a:t>
+            </a:r>
+            <a:r>
+              <a:rPr lang="en-CA" dirty="0"/>
+              <a:t>=</a:t>
+            </a:r>
+            <a:r>
+              <a:rPr lang="en-CA" dirty="0" err="1"/>
+              <a:t>polling&amp;t</a:t>
+            </a:r>
+            <a:r>
+              <a:rPr lang="en-CA" dirty="0"/>
+              <a:t>=</a:t>
+            </a:r>
+            <a:r>
+              <a:rPr lang="en-CA" dirty="0" err="1"/>
+              <a:t>N7C6_EQ</a:t>
+            </a:r>
+            <a:endParaRPr lang="en-CA" dirty="0"/>
+          </a:p>
+          <a:p>
+            <a:pPr marL="457200" lvl="1" indent="0" latinLnBrk="1">
+              <a:buNone/>
+            </a:pPr>
+            <a:endParaRPr lang="en-CA" dirty="0"/>
+          </a:p>
+          <a:p>
+            <a:pPr latinLnBrk="1"/>
+            <a:r>
+              <a:rPr lang="en-CA" b="1" dirty="0"/>
+              <a:t>Query String Parameters</a:t>
+            </a:r>
+          </a:p>
+          <a:p>
+            <a:pPr marL="457200" lvl="1" indent="0" latinLnBrk="1">
+              <a:buNone/>
+            </a:pPr>
+            <a:r>
+              <a:rPr lang="en-CA" dirty="0" err="1"/>
+              <a:t>ip</a:t>
+            </a:r>
+            <a:r>
+              <a:rPr lang="en-CA" dirty="0"/>
+              <a:t>: 24.212.142.167		</a:t>
+            </a:r>
+          </a:p>
+          <a:p>
+            <a:pPr marL="457200" lvl="1" indent="0" latinLnBrk="1">
+              <a:buNone/>
+            </a:pPr>
+            <a:endParaRPr lang="en-CA" dirty="0"/>
+          </a:p>
+          <a:p>
+            <a:endParaRPr lang="en-CA" dirty="0"/>
+          </a:p>
+        </p:txBody>
+      </p:sp>
+    </p:spTree>
+    <p:extLst>
+      <p:ext uri="{BB962C8B-B14F-4D97-AF65-F5344CB8AC3E}">
+        <p14:creationId xmlns:p14="http://schemas.microsoft.com/office/powerpoint/2010/main" val="545528636"/>
+      </p:ext>
+    </p:extLst>
+  </p:cSld>
+  <p:clrMapOvr>
+    <a:masterClrMapping/>
+  </p:clrMapOvr>
+</p:sld>
+</file>
+
+<file path=ppt/slides/slide22.xml><?xml version="1.0" encoding="utf-8"?>
+<p:sld xmlns:a="http://schemas.openxmlformats.org/drawingml/2006/main" xmlns:r="http://schemas.openxmlformats.org/officeDocument/2006/relationships" xmlns:p="http://schemas.openxmlformats.org/presentationml/2006/main">
+  <p:cSld>
+    <p:spTree>
+      <p:nvGrpSpPr>
+        <p:cNvPr id="1" name=""/>
+        <p:cNvGrpSpPr/>
+        <p:nvPr/>
+      </p:nvGrpSpPr>
+      <p:grpSpPr>
+        <a:xfrm>
+          <a:off x="0" y="0"/>
+          <a:ext cx="0" cy="0"/>
+          <a:chOff x="0" y="0"/>
+          <a:chExt cx="0" cy="0"/>
+        </a:xfrm>
+      </p:grpSpPr>
+      <p:sp>
+        <p:nvSpPr>
+          <p:cNvPr id="2" name="Title 1">
+            <a:extLst>
+              <a:ext uri="{FF2B5EF4-FFF2-40B4-BE49-F238E27FC236}">
+                <a16:creationId xmlns:a16="http://schemas.microsoft.com/office/drawing/2014/main" id="{22BE46A5-BE5C-40A2-B259-1E44E2202981}"/>
+              </a:ext>
+            </a:extLst>
+          </p:cNvPr>
+          <p:cNvSpPr>
+            <a:spLocks noGrp="1"/>
+          </p:cNvSpPr>
+          <p:nvPr>
+            <p:ph type="title"/>
+          </p:nvPr>
+        </p:nvSpPr>
+        <p:spPr>
+          <a:xfrm>
+            <a:off x="91751" y="85207"/>
+            <a:ext cx="5021424" cy="586597"/>
+          </a:xfrm>
+        </p:spPr>
+        <p:txBody>
+          <a:bodyPr>
+            <a:normAutofit fontScale="90000"/>
+          </a:bodyPr>
+          <a:lstStyle/>
+          <a:p>
+            <a:r>
+              <a:rPr lang="en-CA" dirty="0"/>
+              <a:t>New Error message:</a:t>
+            </a:r>
+          </a:p>
+        </p:txBody>
+      </p:sp>
+      <p:pic>
+        <p:nvPicPr>
+          <p:cNvPr id="5" name="Picture 4">
+            <a:extLst>
+              <a:ext uri="{FF2B5EF4-FFF2-40B4-BE49-F238E27FC236}">
+                <a16:creationId xmlns:a16="http://schemas.microsoft.com/office/drawing/2014/main" id="{BEE605A6-0264-4B7A-90FE-DC90AD14840C}"/>
+              </a:ext>
+            </a:extLst>
+          </p:cNvPr>
+          <p:cNvPicPr>
+            <a:picLocks noChangeAspect="1"/>
+          </p:cNvPicPr>
+          <p:nvPr/>
+        </p:nvPicPr>
+        <p:blipFill>
+          <a:blip r:embed="rId2"/>
+          <a:stretch>
+            <a:fillRect/>
+          </a:stretch>
+        </p:blipFill>
+        <p:spPr>
+          <a:xfrm>
+            <a:off x="167272" y="2448309"/>
+            <a:ext cx="6485455" cy="4199750"/>
+          </a:xfrm>
+          <a:prstGeom prst="rect">
+            <a:avLst/>
+          </a:prstGeom>
+        </p:spPr>
+      </p:pic>
+      <p:pic>
+        <p:nvPicPr>
+          <p:cNvPr id="6" name="Picture 5">
+            <a:extLst>
+              <a:ext uri="{FF2B5EF4-FFF2-40B4-BE49-F238E27FC236}">
+                <a16:creationId xmlns:a16="http://schemas.microsoft.com/office/drawing/2014/main" id="{C0BFDC74-9E0A-4DF7-9217-4989DD5552BF}"/>
+              </a:ext>
+            </a:extLst>
+          </p:cNvPr>
+          <p:cNvPicPr>
+            <a:picLocks noChangeAspect="1"/>
+          </p:cNvPicPr>
+          <p:nvPr/>
+        </p:nvPicPr>
+        <p:blipFill>
+          <a:blip r:embed="rId3"/>
+          <a:stretch>
+            <a:fillRect/>
+          </a:stretch>
+        </p:blipFill>
+        <p:spPr>
+          <a:xfrm>
+            <a:off x="4432638" y="168598"/>
+            <a:ext cx="7174644" cy="2196320"/>
+          </a:xfrm>
+          <a:prstGeom prst="rect">
+            <a:avLst/>
+          </a:prstGeom>
+        </p:spPr>
+      </p:pic>
+    </p:spTree>
+    <p:extLst>
+      <p:ext uri="{BB962C8B-B14F-4D97-AF65-F5344CB8AC3E}">
+        <p14:creationId xmlns:p14="http://schemas.microsoft.com/office/powerpoint/2010/main" val="3931187049"/>
+      </p:ext>
+    </p:extLst>
+  </p:cSld>
+  <p:clrMapOvr>
+    <a:masterClrMapping/>
+  </p:clrMapOvr>
+</p:sld>
+</file>
+
+<file path=ppt/slides/slide23.xml><?xml version="1.0" encoding="utf-8"?>
+<p:sld xmlns:a="http://schemas.openxmlformats.org/drawingml/2006/main" xmlns:r="http://schemas.openxmlformats.org/officeDocument/2006/relationships" xmlns:p="http://schemas.openxmlformats.org/presentationml/2006/main">
+  <p:cSld>
+    <p:spTree>
+      <p:nvGrpSpPr>
+        <p:cNvPr id="1" name=""/>
+        <p:cNvGrpSpPr/>
+        <p:nvPr/>
+      </p:nvGrpSpPr>
+      <p:grpSpPr>
+        <a:xfrm>
+          <a:off x="0" y="0"/>
+          <a:ext cx="0" cy="0"/>
+          <a:chOff x="0" y="0"/>
+          <a:chExt cx="0" cy="0"/>
+        </a:xfrm>
+      </p:grpSpPr>
+      <p:sp>
+        <p:nvSpPr>
+          <p:cNvPr id="2" name="Title 1">
+            <a:extLst>
+              <a:ext uri="{FF2B5EF4-FFF2-40B4-BE49-F238E27FC236}">
                 <a16:creationId xmlns:a16="http://schemas.microsoft.com/office/drawing/2014/main" id="{CEC34056-2624-473D-88C6-CBA78951C21F}"/>
               </a:ext>
             </a:extLst>
@@ -9775,7 +10650,7 @@
 </p:sld>
 </file>
 
-<file path=ppt/slides/slide22.xml><?xml version="1.0" encoding="utf-8"?>
+<file path=ppt/slides/slide24.xml><?xml version="1.0" encoding="utf-8"?>
 <p:sld xmlns:a="http://schemas.openxmlformats.org/drawingml/2006/main" xmlns:r="http://schemas.openxmlformats.org/officeDocument/2006/relationships" xmlns:p="http://schemas.openxmlformats.org/presentationml/2006/main">
   <p:cSld>
     <p:spTree>
@@ -12709,7 +13584,7 @@
           <p:nvPr>
             <p:extLst>
               <p:ext uri="{D42A27DB-BD31-4B8C-83A1-F6EECF244321}">
-                <p14:modId xmlns:p14="http://schemas.microsoft.com/office/powerpoint/2010/main" val="1002645681"/>
+                <p14:modId xmlns:p14="http://schemas.microsoft.com/office/powerpoint/2010/main" val="1678049192"/>
               </p:ext>
             </p:extLst>
           </p:nvPr>
@@ -12725,14 +13600,14 @@
                 <a:tableStyleId>{5C22544A-7EE6-4342-B048-85BDC9FD1C3A}</a:tableStyleId>
               </a:tblPr>
               <a:tblGrid>
-                <a:gridCol w="914733">
+                <a:gridCol w="1166659">
                   <a:extLst>
                     <a:ext uri="{9D8B030D-6E8A-4147-A177-3AD203B41FA5}">
                       <a16:colId xmlns:a16="http://schemas.microsoft.com/office/drawing/2014/main" val="836460442"/>
                     </a:ext>
                   </a:extLst>
                 </a:gridCol>
-                <a:gridCol w="1373671">
+                <a:gridCol w="1121745">
                   <a:extLst>
                     <a:ext uri="{9D8B030D-6E8A-4147-A177-3AD203B41FA5}">
                       <a16:colId xmlns:a16="http://schemas.microsoft.com/office/drawing/2014/main" val="3002254449"/>
@@ -12768,9 +13643,10 @@
                     <a:lstStyle/>
                     <a:p>
                       <a:r>
-                        <a:rPr lang="en-CA" dirty="0"/>
-                        <a:t>Player</a:t>
+                        <a:rPr lang="en-CA" dirty="0" err="1"/>
+                        <a:t>PlayerID</a:t>
                       </a:r>
+                      <a:endParaRPr lang="en-CA" dirty="0"/>
                     </a:p>
                   </a:txBody>
                   <a:tcPr/>
@@ -12841,7 +13717,7 @@
                     <a:bodyPr/>
                     <a:lstStyle/>
                     <a:p>
-                      <a:endParaRPr lang="en-CA"/>
+                      <a:endParaRPr lang="en-CA" dirty="0"/>
                     </a:p>
                   </a:txBody>
                   <a:tcPr/>
@@ -12898,7 +13774,7 @@
                     <a:bodyPr/>
                     <a:lstStyle/>
                     <a:p>
-                      <a:endParaRPr lang="en-CA"/>
+                      <a:endParaRPr lang="en-CA" dirty="0"/>
                     </a:p>
                   </a:txBody>
                   <a:tcPr/>
@@ -12908,7 +13784,7 @@
                     <a:bodyPr/>
                     <a:lstStyle/>
                     <a:p>
-                      <a:endParaRPr lang="en-CA"/>
+                      <a:endParaRPr lang="en-CA" dirty="0"/>
                     </a:p>
                   </a:txBody>
                   <a:tcPr/>
@@ -12985,7 +13861,7 @@
                     <a:bodyPr/>
                     <a:lstStyle/>
                     <a:p>
-                      <a:endParaRPr lang="en-CA"/>
+                      <a:endParaRPr lang="en-CA" dirty="0"/>
                     </a:p>
                   </a:txBody>
                   <a:tcPr/>

</xml_diff>